<commit_message>
push eks cluster yamls and webinar presentation
</commit_message>
<xml_diff>
--- a/eks/EKS_webinar_v1.0.pptx
+++ b/eks/EKS_webinar_v1.0.pptx
@@ -155,6 +155,7 @@
   <p1510:revLst>
     <p1510:client id="{319468D7-37FB-7B10-29EA-A6682A715D78}" v="443" dt="2020-08-17T10:12:28.900"/>
     <p1510:client id="{53BBE3D2-7DC6-C52F-271C-A83E2D17651A}" v="603" dt="2020-08-17T10:51:06.629"/>
+    <p1510:client id="{637F2237-D3FE-FB80-F0E5-1E8D96465E3C}" v="2" dt="2020-08-18T07:03:58.210"/>
     <p1510:client id="{6AB71E48-B766-DBE0-E3B0-5F8952668C03}" v="50" dt="2020-08-17T10:55:14.052"/>
     <p1510:client id="{8314491E-3BED-4250-06A0-D862EAFBD5D3}" v="28" dt="2020-08-17T10:57:57.504"/>
     <p1510:client id="{BDF5051D-52F9-9045-AEEC-CB24AE9D46F7}" v="26" dt="2020-08-16T08:57:11.021"/>
@@ -24996,97 +24997,6 @@
           </a:p>
         </p:txBody>
       </p:sp>
-      <p:sp>
-        <p:nvSpPr>
-          <p:cNvPr id="5" name="TextBox 4">
-            <a:extLst>
-              <a:ext uri="{FF2B5EF4-FFF2-40B4-BE49-F238E27FC236}">
-                <a16:creationId xmlns:a16="http://schemas.microsoft.com/office/drawing/2014/main" id="{00AA409B-4C82-46C2-B856-801393D84C12}"/>
-              </a:ext>
-            </a:extLst>
-          </p:cNvPr>
-          <p:cNvSpPr txBox="1"/>
-          <p:nvPr/>
-        </p:nvSpPr>
-        <p:spPr>
-          <a:xfrm>
-            <a:off x="2909299" y="2900736"/>
-            <a:ext cx="3607940" cy="461665"/>
-          </a:xfrm>
-          <a:prstGeom prst="rect">
-            <a:avLst/>
-          </a:prstGeom>
-          <a:noFill/>
-        </p:spPr>
-        <p:txBody>
-          <a:bodyPr rot="0" spcFirstLastPara="0" vertOverflow="overflow" horzOverflow="overflow" vert="horz" wrap="square" lIns="91440" tIns="45720" rIns="91440" bIns="45720" numCol="1" spcCol="0" rtlCol="0" fromWordArt="0" anchor="t" anchorCtr="0" forceAA="0" compatLnSpc="1">
-            <a:prstTxWarp prst="textNoShape">
-              <a:avLst/>
-            </a:prstTxWarp>
-            <a:spAutoFit/>
-          </a:bodyPr>
-          <a:lstStyle/>
-          <a:p>
-            <a:r>
-              <a:rPr lang="en-US" sz="2400" dirty="0">
-                <a:latin typeface="Avenir Next LT Pro"/>
-                <a:cs typeface="Calibri"/>
-              </a:rPr>
-              <a:t>Thank you!</a:t>
-            </a:r>
-          </a:p>
-        </p:txBody>
-      </p:sp>
-      <p:sp>
-        <p:nvSpPr>
-          <p:cNvPr id="6" name="TextBox 5">
-            <a:extLst>
-              <a:ext uri="{FF2B5EF4-FFF2-40B4-BE49-F238E27FC236}">
-                <a16:creationId xmlns:a16="http://schemas.microsoft.com/office/drawing/2014/main" id="{527BB206-8284-4952-8D38-E77499EC9BCD}"/>
-              </a:ext>
-            </a:extLst>
-          </p:cNvPr>
-          <p:cNvSpPr txBox="1"/>
-          <p:nvPr/>
-        </p:nvSpPr>
-        <p:spPr>
-          <a:xfrm>
-            <a:off x="7858019" y="4484668"/>
-            <a:ext cx="3393895" cy="830997"/>
-          </a:xfrm>
-          <a:prstGeom prst="rect">
-            <a:avLst/>
-          </a:prstGeom>
-          <a:noFill/>
-        </p:spPr>
-        <p:txBody>
-          <a:bodyPr rot="0" spcFirstLastPara="0" vertOverflow="overflow" horzOverflow="overflow" vert="horz" wrap="square" lIns="91440" tIns="45720" rIns="91440" bIns="45720" numCol="1" spcCol="0" rtlCol="0" fromWordArt="0" anchor="t" anchorCtr="0" forceAA="0" compatLnSpc="1">
-            <a:prstTxWarp prst="textNoShape">
-              <a:avLst/>
-            </a:prstTxWarp>
-            <a:spAutoFit/>
-          </a:bodyPr>
-          <a:lstStyle/>
-          <a:p>
-            <a:pPr algn="l"/>
-            <a:r>
-              <a:rPr lang="en-US" sz="2400" dirty="0">
-                <a:latin typeface="Avenir Next LT Pro"/>
-              </a:rPr>
-              <a:t>fayad@adfolk.com</a:t>
-            </a:r>
-          </a:p>
-          <a:p>
-            <a:r>
-              <a:rPr lang="en-US" sz="2400" dirty="0">
-                <a:latin typeface="Avenir Next LT Pro"/>
-                <a:cs typeface="Calibri"/>
-              </a:rPr>
-              <a:t>nihil.b@adfolks.com</a:t>
-            </a:r>
-          </a:p>
-        </p:txBody>
-      </p:sp>
     </p:spTree>
     <p:extLst>
       <p:ext uri="{BB962C8B-B14F-4D97-AF65-F5344CB8AC3E}">

</xml_diff>

<commit_message>
add autoscaler and spot interrupt handler info
</commit_message>
<xml_diff>
--- a/eks/EKS_webinar_v1.0.pptx
+++ b/eks/EKS_webinar_v1.0.pptx
@@ -6,7 +6,7 @@
     <p:sldMasterId id="2147483663" r:id="rId5"/>
   </p:sldMasterIdLst>
   <p:notesMasterIdLst>
-    <p:notesMasterId r:id="rId29"/>
+    <p:notesMasterId r:id="rId32"/>
   </p:notesMasterIdLst>
   <p:sldIdLst>
     <p:sldId id="1649" r:id="rId6"/>
@@ -27,11 +27,14 @@
     <p:sldId id="1641" r:id="rId21"/>
     <p:sldId id="1642" r:id="rId22"/>
     <p:sldId id="1643" r:id="rId23"/>
-    <p:sldId id="1644" r:id="rId24"/>
-    <p:sldId id="1645" r:id="rId25"/>
-    <p:sldId id="1654" r:id="rId26"/>
-    <p:sldId id="1651" r:id="rId27"/>
-    <p:sldId id="1653" r:id="rId28"/>
+    <p:sldId id="1655" r:id="rId24"/>
+    <p:sldId id="1657" r:id="rId25"/>
+    <p:sldId id="1656" r:id="rId26"/>
+    <p:sldId id="1644" r:id="rId27"/>
+    <p:sldId id="1645" r:id="rId28"/>
+    <p:sldId id="1654" r:id="rId29"/>
+    <p:sldId id="1651" r:id="rId30"/>
+    <p:sldId id="1653" r:id="rId31"/>
   </p:sldIdLst>
   <p:sldSz cx="12192000" cy="6858000"/>
   <p:notesSz cx="6858000" cy="9144000"/>
@@ -155,7 +158,7 @@
   <p1510:revLst>
     <p1510:client id="{319468D7-37FB-7B10-29EA-A6682A715D78}" v="443" dt="2020-08-17T10:12:28.900"/>
     <p1510:client id="{53BBE3D2-7DC6-C52F-271C-A83E2D17651A}" v="603" dt="2020-08-17T10:51:06.629"/>
-    <p1510:client id="{637F2237-D3FE-FB80-F0E5-1E8D96465E3C}" v="2" dt="2020-08-18T07:03:58.210"/>
+    <p1510:client id="{637F2237-D3FE-FB80-F0E5-1E8D96465E3C}" v="659" dt="2020-08-18T07:52:57.054"/>
     <p1510:client id="{6AB71E48-B766-DBE0-E3B0-5F8952668C03}" v="50" dt="2020-08-17T10:55:14.052"/>
     <p1510:client id="{8314491E-3BED-4250-06A0-D862EAFBD5D3}" v="28" dt="2020-08-17T10:57:57.504"/>
     <p1510:client id="{BDF5051D-52F9-9045-AEEC-CB24AE9D46F7}" v="26" dt="2020-08-16T08:57:11.021"/>
@@ -3087,7 +3090,7 @@
           <a:p>
             <a:fld id="{1F8D02B6-4F2D-F541-8F5A-310ED50AAECA}" type="datetimeFigureOut">
               <a:rPr lang="en-US" smtClean="0"/>
-              <a:t>8/17/2020</a:t>
+              <a:t>8/18/2020</a:t>
             </a:fld>
             <a:endParaRPr lang="en-US"/>
           </a:p>
@@ -3953,7 +3956,7 @@
           <a:p>
             <a:fld id="{846CE7D5-CF57-46EF-B807-FDD0502418D4}" type="datetimeFigureOut">
               <a:rPr lang="en-US" smtClean="0"/>
-              <a:t>8/17/2020</a:t>
+              <a:t>8/18/2020</a:t>
             </a:fld>
             <a:endParaRPr lang="en-US"/>
           </a:p>
@@ -4121,7 +4124,7 @@
           <a:p>
             <a:fld id="{846CE7D5-CF57-46EF-B807-FDD0502418D4}" type="datetimeFigureOut">
               <a:rPr lang="en-US" smtClean="0"/>
-              <a:t>8/17/2020</a:t>
+              <a:t>8/18/2020</a:t>
             </a:fld>
             <a:endParaRPr lang="en-US"/>
           </a:p>
@@ -4299,7 +4302,7 @@
           <a:p>
             <a:fld id="{846CE7D5-CF57-46EF-B807-FDD0502418D4}" type="datetimeFigureOut">
               <a:rPr lang="en-US" smtClean="0"/>
-              <a:t>8/17/2020</a:t>
+              <a:t>8/18/2020</a:t>
             </a:fld>
             <a:endParaRPr lang="en-US"/>
           </a:p>
@@ -8009,7 +8012,7 @@
           <a:p>
             <a:fld id="{846CE7D5-CF57-46EF-B807-FDD0502418D4}" type="datetimeFigureOut">
               <a:rPr lang="en-US" smtClean="0"/>
-              <a:t>8/17/2020</a:t>
+              <a:t>8/18/2020</a:t>
             </a:fld>
             <a:endParaRPr lang="en-US"/>
           </a:p>
@@ -10361,7 +10364,7 @@
           <a:p>
             <a:fld id="{846CE7D5-CF57-46EF-B807-FDD0502418D4}" type="datetimeFigureOut">
               <a:rPr lang="en-US" smtClean="0"/>
-              <a:t>8/17/2020</a:t>
+              <a:t>8/18/2020</a:t>
             </a:fld>
             <a:endParaRPr lang="en-US"/>
           </a:p>
@@ -10590,7 +10593,7 @@
           <a:p>
             <a:fld id="{846CE7D5-CF57-46EF-B807-FDD0502418D4}" type="datetimeFigureOut">
               <a:rPr lang="en-US" smtClean="0"/>
-              <a:t>8/17/2020</a:t>
+              <a:t>8/18/2020</a:t>
             </a:fld>
             <a:endParaRPr lang="en-US"/>
           </a:p>
@@ -10954,7 +10957,7 @@
           <a:p>
             <a:fld id="{846CE7D5-CF57-46EF-B807-FDD0502418D4}" type="datetimeFigureOut">
               <a:rPr lang="en-US" smtClean="0"/>
-              <a:t>8/17/2020</a:t>
+              <a:t>8/18/2020</a:t>
             </a:fld>
             <a:endParaRPr lang="en-US"/>
           </a:p>
@@ -11071,7 +11074,7 @@
           <a:p>
             <a:fld id="{846CE7D5-CF57-46EF-B807-FDD0502418D4}" type="datetimeFigureOut">
               <a:rPr lang="en-US" smtClean="0"/>
-              <a:t>8/17/2020</a:t>
+              <a:t>8/18/2020</a:t>
             </a:fld>
             <a:endParaRPr lang="en-US"/>
           </a:p>
@@ -11166,7 +11169,7 @@
           <a:p>
             <a:fld id="{846CE7D5-CF57-46EF-B807-FDD0502418D4}" type="datetimeFigureOut">
               <a:rPr lang="en-US" smtClean="0"/>
-              <a:t>8/17/2020</a:t>
+              <a:t>8/18/2020</a:t>
             </a:fld>
             <a:endParaRPr lang="en-US"/>
           </a:p>
@@ -11441,7 +11444,7 @@
           <a:p>
             <a:fld id="{846CE7D5-CF57-46EF-B807-FDD0502418D4}" type="datetimeFigureOut">
               <a:rPr lang="en-US" smtClean="0"/>
-              <a:t>8/17/2020</a:t>
+              <a:t>8/18/2020</a:t>
             </a:fld>
             <a:endParaRPr lang="en-US"/>
           </a:p>
@@ -11696,7 +11699,7 @@
           <a:p>
             <a:fld id="{846CE7D5-CF57-46EF-B807-FDD0502418D4}" type="datetimeFigureOut">
               <a:rPr lang="en-US" smtClean="0"/>
-              <a:t>8/17/2020</a:t>
+              <a:t>8/18/2020</a:t>
             </a:fld>
             <a:endParaRPr lang="en-US"/>
           </a:p>
@@ -11907,7 +11910,7 @@
           <a:p>
             <a:fld id="{846CE7D5-CF57-46EF-B807-FDD0502418D4}" type="datetimeFigureOut">
               <a:rPr lang="en-US" smtClean="0"/>
-              <a:t>8/17/2020</a:t>
+              <a:t>8/18/2020</a:t>
             </a:fld>
             <a:endParaRPr lang="en-US"/>
           </a:p>
@@ -21977,141 +21980,52 @@
         </p:nvSpPr>
         <p:spPr>
           <a:xfrm>
-            <a:off x="3390948" y="2070615"/>
-            <a:ext cx="7071172" cy="2844462"/>
+            <a:off x="1319531" y="2086785"/>
+            <a:ext cx="10190252" cy="3135563"/>
           </a:xfrm>
         </p:spPr>
         <p:txBody>
-          <a:bodyPr vert="horz" lIns="91440" tIns="45720" rIns="91440" bIns="45720" rtlCol="0" anchor="t">
+          <a:bodyPr vert="horz" lIns="91440" tIns="45720" rIns="91440" bIns="45720" rtlCol="0" anchor="ctr">
             <a:normAutofit/>
           </a:bodyPr>
           <a:lstStyle/>
           <a:p>
             <a:r>
-              <a:rPr lang="en-US" sz="2400" dirty="0" err="1">
-                <a:solidFill>
-                  <a:schemeClr val="bg2">
-                    <a:lumMod val="25000"/>
-                  </a:schemeClr>
-                </a:solidFill>
+              <a:rPr lang="en-US" sz="2400">
                 <a:latin typeface="Avenir Next LT Pro"/>
                 <a:cs typeface="Calibri"/>
               </a:rPr>
-              <a:t>Eksctl</a:t>
+              <a:t>Edit auth configmap with $ </a:t>
             </a:r>
             <a:r>
-              <a:rPr lang="en-US" sz="2400" dirty="0">
-                <a:solidFill>
-                  <a:schemeClr val="bg2">
-                    <a:lumMod val="25000"/>
-                  </a:schemeClr>
-                </a:solidFill>
+              <a:rPr lang="en-US" sz="2400">
+                <a:latin typeface="Consolas"/>
+                <a:ea typeface="+mn-lt"/>
+                <a:cs typeface="+mn-lt"/>
+              </a:rPr>
+              <a:t>kubectl edit -n kube-system configmap/aws-auth</a:t>
+            </a:r>
+            <a:endParaRPr lang="en-US" sz="2400" dirty="0">
+              <a:latin typeface="Consolas"/>
+              <a:cs typeface="Calibri"/>
+            </a:endParaRPr>
+          </a:p>
+          <a:p>
+            <a:r>
+              <a:rPr lang="en-US" sz="2400">
                 <a:latin typeface="Avenir Next LT Pro"/>
                 <a:cs typeface="Calibri"/>
               </a:rPr>
-              <a:t> commands</a:t>
+              <a:t>Add user specific information under mapusers</a:t>
             </a:r>
           </a:p>
           <a:p>
             <a:r>
-              <a:rPr lang="en-US" sz="2400" dirty="0" err="1">
-                <a:solidFill>
-                  <a:schemeClr val="bg2">
-                    <a:lumMod val="25000"/>
-                  </a:schemeClr>
-                </a:solidFill>
+              <a:rPr lang="en-US" sz="2400" dirty="0">
                 <a:latin typeface="Avenir Next LT Pro"/>
                 <a:cs typeface="Calibri"/>
               </a:rPr>
-              <a:t>Kubectl</a:t>
-            </a:r>
-            <a:r>
-              <a:rPr lang="en-US" sz="2400" dirty="0">
-                <a:solidFill>
-                  <a:schemeClr val="bg2">
-                    <a:lumMod val="25000"/>
-                  </a:schemeClr>
-                </a:solidFill>
-                <a:latin typeface="Avenir Next LT Pro"/>
-                <a:cs typeface="Calibri"/>
-              </a:rPr>
-              <a:t> commands</a:t>
-            </a:r>
-          </a:p>
-          <a:p>
-            <a:r>
-              <a:rPr lang="en-US" sz="2400" dirty="0">
-                <a:solidFill>
-                  <a:schemeClr val="bg2">
-                    <a:lumMod val="25000"/>
-                  </a:schemeClr>
-                </a:solidFill>
-                <a:latin typeface="Avenir Next LT Pro"/>
-                <a:cs typeface="Calibri"/>
-              </a:rPr>
-              <a:t>Observing autoscaling and </a:t>
-            </a:r>
-            <a:r>
-              <a:rPr lang="en-US" sz="2400" dirty="0" err="1">
-                <a:solidFill>
-                  <a:schemeClr val="bg2">
-                    <a:lumMod val="25000"/>
-                  </a:schemeClr>
-                </a:solidFill>
-                <a:latin typeface="Avenir Next LT Pro"/>
-                <a:cs typeface="Calibri"/>
-              </a:rPr>
-              <a:t>nodegroup</a:t>
-            </a:r>
-            <a:r>
-              <a:rPr lang="en-US" sz="2400" dirty="0">
-                <a:solidFill>
-                  <a:schemeClr val="bg2">
-                    <a:lumMod val="25000"/>
-                  </a:schemeClr>
-                </a:solidFill>
-                <a:latin typeface="Avenir Next LT Pro"/>
-                <a:cs typeface="Calibri"/>
-              </a:rPr>
-              <a:t> information from AWS console</a:t>
-            </a:r>
-          </a:p>
-          <a:p>
-            <a:r>
-              <a:rPr lang="en-US" sz="2400" dirty="0">
-                <a:solidFill>
-                  <a:schemeClr val="bg2">
-                    <a:lumMod val="25000"/>
-                  </a:schemeClr>
-                </a:solidFill>
-                <a:latin typeface="Avenir Next LT Pro"/>
-                <a:cs typeface="Calibri"/>
-              </a:rPr>
-              <a:t>Enabling </a:t>
-            </a:r>
-            <a:r>
-              <a:rPr lang="en-US" sz="2400" dirty="0" err="1">
-                <a:solidFill>
-                  <a:schemeClr val="bg2">
-                    <a:lumMod val="25000"/>
-                  </a:schemeClr>
-                </a:solidFill>
-                <a:latin typeface="Avenir Next LT Pro"/>
-                <a:cs typeface="Calibri"/>
-              </a:rPr>
-              <a:t>Cloudwatch</a:t>
-            </a:r>
-            <a:r>
-              <a:rPr lang="en-US" sz="2400" dirty="0">
-                <a:solidFill>
-                  <a:schemeClr val="bg2">
-                    <a:lumMod val="25000"/>
-                  </a:schemeClr>
-                </a:solidFill>
-                <a:latin typeface="Avenir Next LT Pro"/>
-                <a:cs typeface="Calibri"/>
-              </a:rPr>
-              <a:t> logging for EKS</a:t>
+              <a:t>https://docs.aws.amazon.com/eks/latest/userguide/add-user-role.html</a:t>
             </a:r>
           </a:p>
         </p:txBody>
@@ -22121,7 +22035,7 @@
           <p:cNvPr id="3" name="Graphic 2">
             <a:extLst>
               <a:ext uri="{FF2B5EF4-FFF2-40B4-BE49-F238E27FC236}">
-                <a16:creationId xmlns:a16="http://schemas.microsoft.com/office/drawing/2014/main" id="{84FAEA61-DFE3-4F57-A345-4DC9C06CBF5B}"/>
+                <a16:creationId xmlns:a16="http://schemas.microsoft.com/office/drawing/2014/main" id="{D2B5E6DC-E98E-4A63-A659-49462A776E30}"/>
               </a:ext>
             </a:extLst>
           </p:cNvPr>
@@ -22154,10 +22068,290 @@
       </p:pic>
       <p:sp>
         <p:nvSpPr>
-          <p:cNvPr id="6" name="Google Shape;91;p17">
+          <p:cNvPr id="4" name="Google Shape;320;p28">
             <a:extLst>
               <a:ext uri="{FF2B5EF4-FFF2-40B4-BE49-F238E27FC236}">
-                <a16:creationId xmlns:a16="http://schemas.microsoft.com/office/drawing/2014/main" id="{CE6767B9-3F66-45F5-8634-EB41A9C08103}"/>
+                <a16:creationId xmlns:a16="http://schemas.microsoft.com/office/drawing/2014/main" id="{23696608-BF4E-41BB-B759-8614FFD4C6C3}"/>
+              </a:ext>
+            </a:extLst>
+          </p:cNvPr>
+          <p:cNvSpPr txBox="1">
+            <a:spLocks/>
+          </p:cNvSpPr>
+          <p:nvPr/>
+        </p:nvSpPr>
+        <p:spPr>
+          <a:xfrm>
+            <a:off x="609953" y="628540"/>
+            <a:ext cx="10646179" cy="1151043"/>
+          </a:xfrm>
+          <a:prstGeom prst="rect">
+            <a:avLst/>
+          </a:prstGeom>
+          <a:noFill/>
+          <a:ln>
+            <a:noFill/>
+          </a:ln>
+        </p:spPr>
+        <p:txBody>
+          <a:bodyPr spcFirstLastPara="1" wrap="square" lIns="0" tIns="30050" rIns="0" bIns="0" anchor="t" anchorCtr="0">
+            <a:noAutofit/>
+          </a:bodyPr>
+          <a:lstStyle>
+            <a:defPPr marR="0" lvl="0" algn="l" rtl="0">
+              <a:lnSpc>
+                <a:spcPct val="100000"/>
+              </a:lnSpc>
+              <a:spcBef>
+                <a:spcPts val="0"/>
+              </a:spcBef>
+              <a:spcAft>
+                <a:spcPts val="0"/>
+              </a:spcAft>
+            </a:defPPr>
+            <a:lvl1pPr marR="0" lvl="0" algn="l" rtl="0">
+              <a:lnSpc>
+                <a:spcPct val="100000"/>
+              </a:lnSpc>
+              <a:spcBef>
+                <a:spcPts val="0"/>
+              </a:spcBef>
+              <a:spcAft>
+                <a:spcPts val="0"/>
+              </a:spcAft>
+              <a:buClr>
+                <a:srgbClr val="000000"/>
+              </a:buClr>
+              <a:buFont typeface="Arial"/>
+              <a:defRPr sz="1400" b="0" i="0" u="none" strike="noStrike" cap="none">
+                <a:solidFill>
+                  <a:srgbClr val="000000"/>
+                </a:solidFill>
+                <a:latin typeface="Arial"/>
+                <a:ea typeface="Arial"/>
+                <a:cs typeface="Arial"/>
+                <a:sym typeface="Arial"/>
+              </a:defRPr>
+            </a:lvl1pPr>
+            <a:lvl2pPr marR="0" lvl="1" algn="l" rtl="0">
+              <a:lnSpc>
+                <a:spcPct val="100000"/>
+              </a:lnSpc>
+              <a:spcBef>
+                <a:spcPts val="0"/>
+              </a:spcBef>
+              <a:spcAft>
+                <a:spcPts val="0"/>
+              </a:spcAft>
+              <a:buClr>
+                <a:srgbClr val="000000"/>
+              </a:buClr>
+              <a:buFont typeface="Arial"/>
+              <a:defRPr sz="1400" b="0" i="0" u="none" strike="noStrike" cap="none">
+                <a:solidFill>
+                  <a:srgbClr val="000000"/>
+                </a:solidFill>
+                <a:latin typeface="Arial"/>
+                <a:ea typeface="Arial"/>
+                <a:cs typeface="Arial"/>
+                <a:sym typeface="Arial"/>
+              </a:defRPr>
+            </a:lvl2pPr>
+            <a:lvl3pPr marR="0" lvl="2" algn="l" rtl="0">
+              <a:lnSpc>
+                <a:spcPct val="100000"/>
+              </a:lnSpc>
+              <a:spcBef>
+                <a:spcPts val="0"/>
+              </a:spcBef>
+              <a:spcAft>
+                <a:spcPts val="0"/>
+              </a:spcAft>
+              <a:buClr>
+                <a:srgbClr val="000000"/>
+              </a:buClr>
+              <a:buFont typeface="Arial"/>
+              <a:defRPr sz="1400" b="0" i="0" u="none" strike="noStrike" cap="none">
+                <a:solidFill>
+                  <a:srgbClr val="000000"/>
+                </a:solidFill>
+                <a:latin typeface="Arial"/>
+                <a:ea typeface="Arial"/>
+                <a:cs typeface="Arial"/>
+                <a:sym typeface="Arial"/>
+              </a:defRPr>
+            </a:lvl3pPr>
+            <a:lvl4pPr marR="0" lvl="3" algn="l" rtl="0">
+              <a:lnSpc>
+                <a:spcPct val="100000"/>
+              </a:lnSpc>
+              <a:spcBef>
+                <a:spcPts val="0"/>
+              </a:spcBef>
+              <a:spcAft>
+                <a:spcPts val="0"/>
+              </a:spcAft>
+              <a:buClr>
+                <a:srgbClr val="000000"/>
+              </a:buClr>
+              <a:buFont typeface="Arial"/>
+              <a:defRPr sz="1400" b="0" i="0" u="none" strike="noStrike" cap="none">
+                <a:solidFill>
+                  <a:srgbClr val="000000"/>
+                </a:solidFill>
+                <a:latin typeface="Arial"/>
+                <a:ea typeface="Arial"/>
+                <a:cs typeface="Arial"/>
+                <a:sym typeface="Arial"/>
+              </a:defRPr>
+            </a:lvl4pPr>
+            <a:lvl5pPr marR="0" lvl="4" algn="l" rtl="0">
+              <a:lnSpc>
+                <a:spcPct val="100000"/>
+              </a:lnSpc>
+              <a:spcBef>
+                <a:spcPts val="0"/>
+              </a:spcBef>
+              <a:spcAft>
+                <a:spcPts val="0"/>
+              </a:spcAft>
+              <a:buClr>
+                <a:srgbClr val="000000"/>
+              </a:buClr>
+              <a:buFont typeface="Arial"/>
+              <a:defRPr sz="1400" b="0" i="0" u="none" strike="noStrike" cap="none">
+                <a:solidFill>
+                  <a:srgbClr val="000000"/>
+                </a:solidFill>
+                <a:latin typeface="Arial"/>
+                <a:ea typeface="Arial"/>
+                <a:cs typeface="Arial"/>
+                <a:sym typeface="Arial"/>
+              </a:defRPr>
+            </a:lvl5pPr>
+            <a:lvl6pPr marR="0" lvl="5" algn="l" rtl="0">
+              <a:lnSpc>
+                <a:spcPct val="100000"/>
+              </a:lnSpc>
+              <a:spcBef>
+                <a:spcPts val="0"/>
+              </a:spcBef>
+              <a:spcAft>
+                <a:spcPts val="0"/>
+              </a:spcAft>
+              <a:buClr>
+                <a:srgbClr val="000000"/>
+              </a:buClr>
+              <a:buFont typeface="Arial"/>
+              <a:defRPr sz="1400" b="0" i="0" u="none" strike="noStrike" cap="none">
+                <a:solidFill>
+                  <a:srgbClr val="000000"/>
+                </a:solidFill>
+                <a:latin typeface="Arial"/>
+                <a:ea typeface="Arial"/>
+                <a:cs typeface="Arial"/>
+                <a:sym typeface="Arial"/>
+              </a:defRPr>
+            </a:lvl6pPr>
+            <a:lvl7pPr marR="0" lvl="6" algn="l" rtl="0">
+              <a:lnSpc>
+                <a:spcPct val="100000"/>
+              </a:lnSpc>
+              <a:spcBef>
+                <a:spcPts val="0"/>
+              </a:spcBef>
+              <a:spcAft>
+                <a:spcPts val="0"/>
+              </a:spcAft>
+              <a:buClr>
+                <a:srgbClr val="000000"/>
+              </a:buClr>
+              <a:buFont typeface="Arial"/>
+              <a:defRPr sz="1400" b="0" i="0" u="none" strike="noStrike" cap="none">
+                <a:solidFill>
+                  <a:srgbClr val="000000"/>
+                </a:solidFill>
+                <a:latin typeface="Arial"/>
+                <a:ea typeface="Arial"/>
+                <a:cs typeface="Arial"/>
+                <a:sym typeface="Arial"/>
+              </a:defRPr>
+            </a:lvl7pPr>
+            <a:lvl8pPr marR="0" lvl="7" algn="l" rtl="0">
+              <a:lnSpc>
+                <a:spcPct val="100000"/>
+              </a:lnSpc>
+              <a:spcBef>
+                <a:spcPts val="0"/>
+              </a:spcBef>
+              <a:spcAft>
+                <a:spcPts val="0"/>
+              </a:spcAft>
+              <a:buClr>
+                <a:srgbClr val="000000"/>
+              </a:buClr>
+              <a:buFont typeface="Arial"/>
+              <a:defRPr sz="1400" b="0" i="0" u="none" strike="noStrike" cap="none">
+                <a:solidFill>
+                  <a:srgbClr val="000000"/>
+                </a:solidFill>
+                <a:latin typeface="Arial"/>
+                <a:ea typeface="Arial"/>
+                <a:cs typeface="Arial"/>
+                <a:sym typeface="Arial"/>
+              </a:defRPr>
+            </a:lvl8pPr>
+            <a:lvl9pPr marR="0" lvl="8" algn="l" rtl="0">
+              <a:lnSpc>
+                <a:spcPct val="100000"/>
+              </a:lnSpc>
+              <a:spcBef>
+                <a:spcPts val="0"/>
+              </a:spcBef>
+              <a:spcAft>
+                <a:spcPts val="0"/>
+              </a:spcAft>
+              <a:buClr>
+                <a:srgbClr val="000000"/>
+              </a:buClr>
+              <a:buFont typeface="Arial"/>
+              <a:defRPr sz="1400" b="0" i="0" u="none" strike="noStrike" cap="none">
+                <a:solidFill>
+                  <a:srgbClr val="000000"/>
+                </a:solidFill>
+                <a:latin typeface="Arial"/>
+                <a:ea typeface="Arial"/>
+                <a:cs typeface="Arial"/>
+                <a:sym typeface="Arial"/>
+              </a:defRPr>
+            </a:lvl9pPr>
+          </a:lstStyle>
+          <a:p>
+            <a:pPr marL="8255" marR="3175"/>
+            <a:r>
+              <a:rPr lang="en-US" sz="4400" b="1">
+                <a:solidFill>
+                  <a:srgbClr val="3D3D3D"/>
+                </a:solidFill>
+                <a:latin typeface="Avenir Next LT Pro"/>
+              </a:rPr>
+              <a:t>Adding your IAM user to cluster</a:t>
+            </a:r>
+            <a:endParaRPr lang="en-US" sz="4400" b="1" dirty="0">
+              <a:solidFill>
+                <a:srgbClr val="3D3D3D"/>
+              </a:solidFill>
+              <a:latin typeface="Avenir Next LT Pro"/>
+            </a:endParaRPr>
+          </a:p>
+        </p:txBody>
+      </p:sp>
+      <p:sp>
+        <p:nvSpPr>
+          <p:cNvPr id="10" name="Google Shape;91;p17">
+            <a:extLst>
+              <a:ext uri="{FF2B5EF4-FFF2-40B4-BE49-F238E27FC236}">
+                <a16:creationId xmlns:a16="http://schemas.microsoft.com/office/drawing/2014/main" id="{9A378C68-A0E3-4E70-B83D-02E03DC76D8F}"/>
               </a:ext>
             </a:extLst>
           </p:cNvPr>
@@ -22166,8 +22360,8 @@
         </p:nvSpPr>
         <p:spPr>
           <a:xfrm>
-            <a:off x="3520" y="370556"/>
-            <a:ext cx="487258" cy="1342465"/>
+            <a:off x="-1668" y="352471"/>
+            <a:ext cx="430272" cy="1259203"/>
           </a:xfrm>
           <a:custGeom>
             <a:avLst/>
@@ -22220,318 +22414,12 @@
           <a:bodyPr spcFirstLastPara="1" wrap="square" lIns="0" tIns="0" rIns="0" bIns="0" anchor="t" anchorCtr="0">
             <a:noAutofit/>
           </a:bodyPr>
-          <a:lstStyle>
-            <a:defPPr marR="0" lvl="0" algn="l" rtl="0">
-              <a:lnSpc>
-                <a:spcPct val="100000"/>
-              </a:lnSpc>
-              <a:spcBef>
-                <a:spcPts val="0"/>
-              </a:spcBef>
-              <a:spcAft>
-                <a:spcPts val="0"/>
-              </a:spcAft>
-            </a:defPPr>
-            <a:lvl1pPr marR="0" lvl="0" algn="l" rtl="0">
-              <a:lnSpc>
-                <a:spcPct val="100000"/>
-              </a:lnSpc>
-              <a:spcBef>
-                <a:spcPts val="0"/>
-              </a:spcBef>
-              <a:spcAft>
-                <a:spcPts val="0"/>
-              </a:spcAft>
-              <a:buClr>
-                <a:srgbClr val="000000"/>
-              </a:buClr>
-              <a:buFont typeface="Arial"/>
-              <a:defRPr sz="1400" b="0" i="0" u="none" strike="noStrike" cap="none">
-                <a:solidFill>
-                  <a:srgbClr val="000000"/>
-                </a:solidFill>
-                <a:latin typeface="Arial"/>
-                <a:ea typeface="Arial"/>
-                <a:cs typeface="Arial"/>
-                <a:sym typeface="Arial"/>
-              </a:defRPr>
-            </a:lvl1pPr>
-            <a:lvl2pPr marR="0" lvl="1" algn="l" rtl="0">
-              <a:lnSpc>
-                <a:spcPct val="100000"/>
-              </a:lnSpc>
-              <a:spcBef>
-                <a:spcPts val="0"/>
-              </a:spcBef>
-              <a:spcAft>
-                <a:spcPts val="0"/>
-              </a:spcAft>
-              <a:buClr>
-                <a:srgbClr val="000000"/>
-              </a:buClr>
-              <a:buFont typeface="Arial"/>
-              <a:defRPr sz="1400" b="0" i="0" u="none" strike="noStrike" cap="none">
-                <a:solidFill>
-                  <a:srgbClr val="000000"/>
-                </a:solidFill>
-                <a:latin typeface="Arial"/>
-                <a:ea typeface="Arial"/>
-                <a:cs typeface="Arial"/>
-                <a:sym typeface="Arial"/>
-              </a:defRPr>
-            </a:lvl2pPr>
-            <a:lvl3pPr marR="0" lvl="2" algn="l" rtl="0">
-              <a:lnSpc>
-                <a:spcPct val="100000"/>
-              </a:lnSpc>
-              <a:spcBef>
-                <a:spcPts val="0"/>
-              </a:spcBef>
-              <a:spcAft>
-                <a:spcPts val="0"/>
-              </a:spcAft>
-              <a:buClr>
-                <a:srgbClr val="000000"/>
-              </a:buClr>
-              <a:buFont typeface="Arial"/>
-              <a:defRPr sz="1400" b="0" i="0" u="none" strike="noStrike" cap="none">
-                <a:solidFill>
-                  <a:srgbClr val="000000"/>
-                </a:solidFill>
-                <a:latin typeface="Arial"/>
-                <a:ea typeface="Arial"/>
-                <a:cs typeface="Arial"/>
-                <a:sym typeface="Arial"/>
-              </a:defRPr>
-            </a:lvl3pPr>
-            <a:lvl4pPr marR="0" lvl="3" algn="l" rtl="0">
-              <a:lnSpc>
-                <a:spcPct val="100000"/>
-              </a:lnSpc>
-              <a:spcBef>
-                <a:spcPts val="0"/>
-              </a:spcBef>
-              <a:spcAft>
-                <a:spcPts val="0"/>
-              </a:spcAft>
-              <a:buClr>
-                <a:srgbClr val="000000"/>
-              </a:buClr>
-              <a:buFont typeface="Arial"/>
-              <a:defRPr sz="1400" b="0" i="0" u="none" strike="noStrike" cap="none">
-                <a:solidFill>
-                  <a:srgbClr val="000000"/>
-                </a:solidFill>
-                <a:latin typeface="Arial"/>
-                <a:ea typeface="Arial"/>
-                <a:cs typeface="Arial"/>
-                <a:sym typeface="Arial"/>
-              </a:defRPr>
-            </a:lvl4pPr>
-            <a:lvl5pPr marR="0" lvl="4" algn="l" rtl="0">
-              <a:lnSpc>
-                <a:spcPct val="100000"/>
-              </a:lnSpc>
-              <a:spcBef>
-                <a:spcPts val="0"/>
-              </a:spcBef>
-              <a:spcAft>
-                <a:spcPts val="0"/>
-              </a:spcAft>
-              <a:buClr>
-                <a:srgbClr val="000000"/>
-              </a:buClr>
-              <a:buFont typeface="Arial"/>
-              <a:defRPr sz="1400" b="0" i="0" u="none" strike="noStrike" cap="none">
-                <a:solidFill>
-                  <a:srgbClr val="000000"/>
-                </a:solidFill>
-                <a:latin typeface="Arial"/>
-                <a:ea typeface="Arial"/>
-                <a:cs typeface="Arial"/>
-                <a:sym typeface="Arial"/>
-              </a:defRPr>
-            </a:lvl5pPr>
-            <a:lvl6pPr marR="0" lvl="5" algn="l" rtl="0">
-              <a:lnSpc>
-                <a:spcPct val="100000"/>
-              </a:lnSpc>
-              <a:spcBef>
-                <a:spcPts val="0"/>
-              </a:spcBef>
-              <a:spcAft>
-                <a:spcPts val="0"/>
-              </a:spcAft>
-              <a:buClr>
-                <a:srgbClr val="000000"/>
-              </a:buClr>
-              <a:buFont typeface="Arial"/>
-              <a:defRPr sz="1400" b="0" i="0" u="none" strike="noStrike" cap="none">
-                <a:solidFill>
-                  <a:srgbClr val="000000"/>
-                </a:solidFill>
-                <a:latin typeface="Arial"/>
-                <a:ea typeface="Arial"/>
-                <a:cs typeface="Arial"/>
-                <a:sym typeface="Arial"/>
-              </a:defRPr>
-            </a:lvl6pPr>
-            <a:lvl7pPr marR="0" lvl="6" algn="l" rtl="0">
-              <a:lnSpc>
-                <a:spcPct val="100000"/>
-              </a:lnSpc>
-              <a:spcBef>
-                <a:spcPts val="0"/>
-              </a:spcBef>
-              <a:spcAft>
-                <a:spcPts val="0"/>
-              </a:spcAft>
-              <a:buClr>
-                <a:srgbClr val="000000"/>
-              </a:buClr>
-              <a:buFont typeface="Arial"/>
-              <a:defRPr sz="1400" b="0" i="0" u="none" strike="noStrike" cap="none">
-                <a:solidFill>
-                  <a:srgbClr val="000000"/>
-                </a:solidFill>
-                <a:latin typeface="Arial"/>
-                <a:ea typeface="Arial"/>
-                <a:cs typeface="Arial"/>
-                <a:sym typeface="Arial"/>
-              </a:defRPr>
-            </a:lvl7pPr>
-            <a:lvl8pPr marR="0" lvl="7" algn="l" rtl="0">
-              <a:lnSpc>
-                <a:spcPct val="100000"/>
-              </a:lnSpc>
-              <a:spcBef>
-                <a:spcPts val="0"/>
-              </a:spcBef>
-              <a:spcAft>
-                <a:spcPts val="0"/>
-              </a:spcAft>
-              <a:buClr>
-                <a:srgbClr val="000000"/>
-              </a:buClr>
-              <a:buFont typeface="Arial"/>
-              <a:defRPr sz="1400" b="0" i="0" u="none" strike="noStrike" cap="none">
-                <a:solidFill>
-                  <a:srgbClr val="000000"/>
-                </a:solidFill>
-                <a:latin typeface="Arial"/>
-                <a:ea typeface="Arial"/>
-                <a:cs typeface="Arial"/>
-                <a:sym typeface="Arial"/>
-              </a:defRPr>
-            </a:lvl8pPr>
-            <a:lvl9pPr marR="0" lvl="8" algn="l" rtl="0">
-              <a:lnSpc>
-                <a:spcPct val="100000"/>
-              </a:lnSpc>
-              <a:spcBef>
-                <a:spcPts val="0"/>
-              </a:spcBef>
-              <a:spcAft>
-                <a:spcPts val="0"/>
-              </a:spcAft>
-              <a:buClr>
-                <a:srgbClr val="000000"/>
-              </a:buClr>
-              <a:buFont typeface="Arial"/>
-              <a:defRPr sz="1400" b="0" i="0" u="none" strike="noStrike" cap="none">
-                <a:solidFill>
-                  <a:srgbClr val="000000"/>
-                </a:solidFill>
-                <a:latin typeface="Arial"/>
-                <a:ea typeface="Arial"/>
-                <a:cs typeface="Arial"/>
-                <a:sym typeface="Arial"/>
-              </a:defRPr>
-            </a:lvl9pPr>
-          </a:lstStyle>
-          <a:p>
-            <a:pPr marL="0" marR="0" lvl="0" indent="0" algn="l" rtl="0">
-              <a:spcBef>
-                <a:spcPts val="0"/>
-              </a:spcBef>
-              <a:spcAft>
-                <a:spcPts val="0"/>
-              </a:spcAft>
-              <a:buNone/>
-            </a:pPr>
-            <a:endParaRPr sz="1800">
+          <a:lstStyle/>
+          <a:p>
+            <a:endParaRPr sz="1200">
               <a:highlight>
                 <a:schemeClr val="lt1"/>
               </a:highlight>
-            </a:endParaRPr>
-          </a:p>
-        </p:txBody>
-      </p:sp>
-      <p:sp>
-        <p:nvSpPr>
-          <p:cNvPr id="4" name="Google Shape;92;p17">
-            <a:extLst>
-              <a:ext uri="{FF2B5EF4-FFF2-40B4-BE49-F238E27FC236}">
-                <a16:creationId xmlns:a16="http://schemas.microsoft.com/office/drawing/2014/main" id="{1149C26A-9C1D-45AD-87BF-3F345306D3BA}"/>
-              </a:ext>
-            </a:extLst>
-          </p:cNvPr>
-          <p:cNvSpPr txBox="1"/>
-          <p:nvPr/>
-        </p:nvSpPr>
-        <p:spPr>
-          <a:xfrm>
-            <a:off x="673312" y="433478"/>
-            <a:ext cx="7025005" cy="908385"/>
-          </a:xfrm>
-          <a:prstGeom prst="rect">
-            <a:avLst/>
-          </a:prstGeom>
-          <a:noFill/>
-          <a:ln>
-            <a:noFill/>
-          </a:ln>
-        </p:spPr>
-        <p:txBody>
-          <a:bodyPr spcFirstLastPara="1" wrap="square" lIns="0" tIns="0" rIns="0" bIns="0" anchor="t" anchorCtr="0">
-            <a:noAutofit/>
-          </a:bodyPr>
-          <a:lstStyle/>
-          <a:p>
-            <a:pPr marL="8255"/>
-            <a:r>
-              <a:rPr lang="en-US" sz="4400" b="1">
-                <a:solidFill>
-                  <a:srgbClr val="666666"/>
-                </a:solidFill>
-                <a:latin typeface="Avenir Next LT Pro"/>
-                <a:sym typeface="Barlow Black"/>
-              </a:rPr>
-              <a:t>OBSERVABILITY </a:t>
-            </a:r>
-            <a:endParaRPr lang="en-US">
-              <a:solidFill>
-                <a:srgbClr val="000000"/>
-              </a:solidFill>
-              <a:latin typeface="Calibri" panose="020F0502020204030204"/>
-              <a:cs typeface="Calibri" panose="020F0502020204030204"/>
-              <a:sym typeface="Barlow Black"/>
-            </a:endParaRPr>
-          </a:p>
-          <a:p>
-            <a:pPr marL="8255"/>
-            <a:r>
-              <a:rPr lang="en-US" sz="4400" b="1">
-                <a:solidFill>
-                  <a:srgbClr val="666666"/>
-                </a:solidFill>
-                <a:latin typeface="Avenir Next LT Pro"/>
-                <a:sym typeface="Barlow Black"/>
-              </a:rPr>
-              <a:t>IN EKS</a:t>
-            </a:r>
-            <a:endParaRPr lang="en-US">
-              <a:cs typeface="Calibri"/>
             </a:endParaRPr>
           </a:p>
         </p:txBody>
@@ -22539,7 +22427,7 @@
     </p:spTree>
     <p:extLst>
       <p:ext uri="{BB962C8B-B14F-4D97-AF65-F5344CB8AC3E}">
-        <p14:creationId xmlns:p14="http://schemas.microsoft.com/office/powerpoint/2010/main" val="85318453"/>
+        <p14:creationId xmlns:p14="http://schemas.microsoft.com/office/powerpoint/2010/main" val="2980202023"/>
       </p:ext>
     </p:extLst>
   </p:cSld>
@@ -23490,6 +23378,1672 @@
       </p:grpSpPr>
       <p:sp>
         <p:nvSpPr>
+          <p:cNvPr id="5" name="Content Placeholder 4">
+            <a:extLst>
+              <a:ext uri="{FF2B5EF4-FFF2-40B4-BE49-F238E27FC236}">
+                <a16:creationId xmlns:a16="http://schemas.microsoft.com/office/drawing/2014/main" id="{623EA3B1-5BDE-4815-9403-E17C025D51AC}"/>
+              </a:ext>
+            </a:extLst>
+          </p:cNvPr>
+          <p:cNvSpPr>
+            <a:spLocks noGrp="1"/>
+          </p:cNvSpPr>
+          <p:nvPr>
+            <p:ph idx="1"/>
+          </p:nvPr>
+        </p:nvSpPr>
+        <p:spPr>
+          <a:xfrm>
+            <a:off x="1319531" y="2086785"/>
+            <a:ext cx="10190252" cy="3135563"/>
+          </a:xfrm>
+        </p:spPr>
+        <p:txBody>
+          <a:bodyPr vert="horz" lIns="91440" tIns="45720" rIns="91440" bIns="45720" rtlCol="0" anchor="ctr">
+            <a:normAutofit/>
+          </a:bodyPr>
+          <a:lstStyle/>
+          <a:p>
+            <a:r>
+              <a:rPr lang="en-US" sz="2400">
+                <a:latin typeface="Avenir Next LT Pro"/>
+                <a:cs typeface="Calibri"/>
+              </a:rPr>
+              <a:t>Adding autoscaling specific configs in cluster.yaml before deploy</a:t>
+            </a:r>
+          </a:p>
+          <a:p>
+            <a:r>
+              <a:rPr lang="en-US" sz="2400">
+                <a:latin typeface="Avenir Next LT Pro"/>
+                <a:cs typeface="Calibri"/>
+              </a:rPr>
+              <a:t>Adding tags to autoscaling groups for discovery after cluster deploy</a:t>
+            </a:r>
+            <a:endParaRPr lang="en-US" sz="2400" dirty="0">
+              <a:latin typeface="Avenir Next LT Pro"/>
+              <a:cs typeface="Calibri"/>
+            </a:endParaRPr>
+          </a:p>
+          <a:p>
+            <a:r>
+              <a:rPr lang="en-US" sz="2400">
+                <a:latin typeface="Avenir Next LT Pro"/>
+                <a:cs typeface="Calibri"/>
+              </a:rPr>
+              <a:t>Modifying cluster-autoscaler.yaml with your clustername, nodegroups</a:t>
+            </a:r>
+          </a:p>
+          <a:p>
+            <a:r>
+              <a:rPr lang="en-US" sz="2400">
+                <a:latin typeface="Avenir Next LT Pro"/>
+                <a:ea typeface="+mn-lt"/>
+                <a:cs typeface="+mn-lt"/>
+              </a:rPr>
+              <a:t>Applying cluster-autoscaler.yaml into cluster</a:t>
+            </a:r>
+            <a:endParaRPr lang="en-US" sz="2400" dirty="0">
+              <a:latin typeface="Avenir Next LT Pro"/>
+              <a:cs typeface="Calibri"/>
+            </a:endParaRPr>
+          </a:p>
+          <a:p>
+            <a:r>
+              <a:rPr lang="en-US" sz="2400" dirty="0">
+                <a:latin typeface="Avenir Next LT Pro"/>
+                <a:ea typeface="+mn-lt"/>
+                <a:cs typeface="+mn-lt"/>
+              </a:rPr>
+              <a:t>https://docs.aws.amazon.com/eks/latest/userguide/cluster-autoscaler.html</a:t>
+            </a:r>
+            <a:endParaRPr lang="en-US" sz="2400" dirty="0">
+              <a:latin typeface="Avenir Next LT Pro"/>
+              <a:cs typeface="Calibri"/>
+            </a:endParaRPr>
+          </a:p>
+          <a:p>
+            <a:endParaRPr lang="en-US" sz="2400" dirty="0">
+              <a:latin typeface="Avenir Next LT Pro"/>
+              <a:cs typeface="Calibri"/>
+            </a:endParaRPr>
+          </a:p>
+        </p:txBody>
+      </p:sp>
+      <p:pic>
+        <p:nvPicPr>
+          <p:cNvPr id="3" name="Graphic 2">
+            <a:extLst>
+              <a:ext uri="{FF2B5EF4-FFF2-40B4-BE49-F238E27FC236}">
+                <a16:creationId xmlns:a16="http://schemas.microsoft.com/office/drawing/2014/main" id="{D2B5E6DC-E98E-4A63-A659-49462A776E30}"/>
+              </a:ext>
+            </a:extLst>
+          </p:cNvPr>
+          <p:cNvPicPr>
+            <a:picLocks noChangeAspect="1"/>
+          </p:cNvPicPr>
+          <p:nvPr/>
+        </p:nvPicPr>
+        <p:blipFill>
+          <a:blip r:embed="rId2">
+            <a:extLst>
+              <a:ext uri="{96DAC541-7B7A-43D3-8B79-37D633B846F1}">
+                <asvg:svgBlip xmlns:asvg="http://schemas.microsoft.com/office/drawing/2016/SVG/main" r:embed="rId3"/>
+              </a:ext>
+            </a:extLst>
+          </a:blip>
+          <a:stretch>
+            <a:fillRect/>
+          </a:stretch>
+        </p:blipFill>
+        <p:spPr>
+          <a:xfrm>
+            <a:off x="537714" y="5639735"/>
+            <a:ext cx="2332007" cy="941285"/>
+          </a:xfrm>
+          <a:prstGeom prst="rect">
+            <a:avLst/>
+          </a:prstGeom>
+        </p:spPr>
+      </p:pic>
+      <p:sp>
+        <p:nvSpPr>
+          <p:cNvPr id="4" name="Google Shape;320;p28">
+            <a:extLst>
+              <a:ext uri="{FF2B5EF4-FFF2-40B4-BE49-F238E27FC236}">
+                <a16:creationId xmlns:a16="http://schemas.microsoft.com/office/drawing/2014/main" id="{23696608-BF4E-41BB-B759-8614FFD4C6C3}"/>
+              </a:ext>
+            </a:extLst>
+          </p:cNvPr>
+          <p:cNvSpPr txBox="1">
+            <a:spLocks/>
+          </p:cNvSpPr>
+          <p:nvPr/>
+        </p:nvSpPr>
+        <p:spPr>
+          <a:xfrm>
+            <a:off x="609953" y="628540"/>
+            <a:ext cx="10646179" cy="1151043"/>
+          </a:xfrm>
+          <a:prstGeom prst="rect">
+            <a:avLst/>
+          </a:prstGeom>
+          <a:noFill/>
+          <a:ln>
+            <a:noFill/>
+          </a:ln>
+        </p:spPr>
+        <p:txBody>
+          <a:bodyPr spcFirstLastPara="1" wrap="square" lIns="0" tIns="30050" rIns="0" bIns="0" anchor="t" anchorCtr="0">
+            <a:noAutofit/>
+          </a:bodyPr>
+          <a:lstStyle>
+            <a:defPPr marR="0" lvl="0" algn="l" rtl="0">
+              <a:lnSpc>
+                <a:spcPct val="100000"/>
+              </a:lnSpc>
+              <a:spcBef>
+                <a:spcPts val="0"/>
+              </a:spcBef>
+              <a:spcAft>
+                <a:spcPts val="0"/>
+              </a:spcAft>
+            </a:defPPr>
+            <a:lvl1pPr marR="0" lvl="0" algn="l" rtl="0">
+              <a:lnSpc>
+                <a:spcPct val="100000"/>
+              </a:lnSpc>
+              <a:spcBef>
+                <a:spcPts val="0"/>
+              </a:spcBef>
+              <a:spcAft>
+                <a:spcPts val="0"/>
+              </a:spcAft>
+              <a:buClr>
+                <a:srgbClr val="000000"/>
+              </a:buClr>
+              <a:buFont typeface="Arial"/>
+              <a:defRPr sz="1400" b="0" i="0" u="none" strike="noStrike" cap="none">
+                <a:solidFill>
+                  <a:srgbClr val="000000"/>
+                </a:solidFill>
+                <a:latin typeface="Arial"/>
+                <a:ea typeface="Arial"/>
+                <a:cs typeface="Arial"/>
+                <a:sym typeface="Arial"/>
+              </a:defRPr>
+            </a:lvl1pPr>
+            <a:lvl2pPr marR="0" lvl="1" algn="l" rtl="0">
+              <a:lnSpc>
+                <a:spcPct val="100000"/>
+              </a:lnSpc>
+              <a:spcBef>
+                <a:spcPts val="0"/>
+              </a:spcBef>
+              <a:spcAft>
+                <a:spcPts val="0"/>
+              </a:spcAft>
+              <a:buClr>
+                <a:srgbClr val="000000"/>
+              </a:buClr>
+              <a:buFont typeface="Arial"/>
+              <a:defRPr sz="1400" b="0" i="0" u="none" strike="noStrike" cap="none">
+                <a:solidFill>
+                  <a:srgbClr val="000000"/>
+                </a:solidFill>
+                <a:latin typeface="Arial"/>
+                <a:ea typeface="Arial"/>
+                <a:cs typeface="Arial"/>
+                <a:sym typeface="Arial"/>
+              </a:defRPr>
+            </a:lvl2pPr>
+            <a:lvl3pPr marR="0" lvl="2" algn="l" rtl="0">
+              <a:lnSpc>
+                <a:spcPct val="100000"/>
+              </a:lnSpc>
+              <a:spcBef>
+                <a:spcPts val="0"/>
+              </a:spcBef>
+              <a:spcAft>
+                <a:spcPts val="0"/>
+              </a:spcAft>
+              <a:buClr>
+                <a:srgbClr val="000000"/>
+              </a:buClr>
+              <a:buFont typeface="Arial"/>
+              <a:defRPr sz="1400" b="0" i="0" u="none" strike="noStrike" cap="none">
+                <a:solidFill>
+                  <a:srgbClr val="000000"/>
+                </a:solidFill>
+                <a:latin typeface="Arial"/>
+                <a:ea typeface="Arial"/>
+                <a:cs typeface="Arial"/>
+                <a:sym typeface="Arial"/>
+              </a:defRPr>
+            </a:lvl3pPr>
+            <a:lvl4pPr marR="0" lvl="3" algn="l" rtl="0">
+              <a:lnSpc>
+                <a:spcPct val="100000"/>
+              </a:lnSpc>
+              <a:spcBef>
+                <a:spcPts val="0"/>
+              </a:spcBef>
+              <a:spcAft>
+                <a:spcPts val="0"/>
+              </a:spcAft>
+              <a:buClr>
+                <a:srgbClr val="000000"/>
+              </a:buClr>
+              <a:buFont typeface="Arial"/>
+              <a:defRPr sz="1400" b="0" i="0" u="none" strike="noStrike" cap="none">
+                <a:solidFill>
+                  <a:srgbClr val="000000"/>
+                </a:solidFill>
+                <a:latin typeface="Arial"/>
+                <a:ea typeface="Arial"/>
+                <a:cs typeface="Arial"/>
+                <a:sym typeface="Arial"/>
+              </a:defRPr>
+            </a:lvl4pPr>
+            <a:lvl5pPr marR="0" lvl="4" algn="l" rtl="0">
+              <a:lnSpc>
+                <a:spcPct val="100000"/>
+              </a:lnSpc>
+              <a:spcBef>
+                <a:spcPts val="0"/>
+              </a:spcBef>
+              <a:spcAft>
+                <a:spcPts val="0"/>
+              </a:spcAft>
+              <a:buClr>
+                <a:srgbClr val="000000"/>
+              </a:buClr>
+              <a:buFont typeface="Arial"/>
+              <a:defRPr sz="1400" b="0" i="0" u="none" strike="noStrike" cap="none">
+                <a:solidFill>
+                  <a:srgbClr val="000000"/>
+                </a:solidFill>
+                <a:latin typeface="Arial"/>
+                <a:ea typeface="Arial"/>
+                <a:cs typeface="Arial"/>
+                <a:sym typeface="Arial"/>
+              </a:defRPr>
+            </a:lvl5pPr>
+            <a:lvl6pPr marR="0" lvl="5" algn="l" rtl="0">
+              <a:lnSpc>
+                <a:spcPct val="100000"/>
+              </a:lnSpc>
+              <a:spcBef>
+                <a:spcPts val="0"/>
+              </a:spcBef>
+              <a:spcAft>
+                <a:spcPts val="0"/>
+              </a:spcAft>
+              <a:buClr>
+                <a:srgbClr val="000000"/>
+              </a:buClr>
+              <a:buFont typeface="Arial"/>
+              <a:defRPr sz="1400" b="0" i="0" u="none" strike="noStrike" cap="none">
+                <a:solidFill>
+                  <a:srgbClr val="000000"/>
+                </a:solidFill>
+                <a:latin typeface="Arial"/>
+                <a:ea typeface="Arial"/>
+                <a:cs typeface="Arial"/>
+                <a:sym typeface="Arial"/>
+              </a:defRPr>
+            </a:lvl6pPr>
+            <a:lvl7pPr marR="0" lvl="6" algn="l" rtl="0">
+              <a:lnSpc>
+                <a:spcPct val="100000"/>
+              </a:lnSpc>
+              <a:spcBef>
+                <a:spcPts val="0"/>
+              </a:spcBef>
+              <a:spcAft>
+                <a:spcPts val="0"/>
+              </a:spcAft>
+              <a:buClr>
+                <a:srgbClr val="000000"/>
+              </a:buClr>
+              <a:buFont typeface="Arial"/>
+              <a:defRPr sz="1400" b="0" i="0" u="none" strike="noStrike" cap="none">
+                <a:solidFill>
+                  <a:srgbClr val="000000"/>
+                </a:solidFill>
+                <a:latin typeface="Arial"/>
+                <a:ea typeface="Arial"/>
+                <a:cs typeface="Arial"/>
+                <a:sym typeface="Arial"/>
+              </a:defRPr>
+            </a:lvl7pPr>
+            <a:lvl8pPr marR="0" lvl="7" algn="l" rtl="0">
+              <a:lnSpc>
+                <a:spcPct val="100000"/>
+              </a:lnSpc>
+              <a:spcBef>
+                <a:spcPts val="0"/>
+              </a:spcBef>
+              <a:spcAft>
+                <a:spcPts val="0"/>
+              </a:spcAft>
+              <a:buClr>
+                <a:srgbClr val="000000"/>
+              </a:buClr>
+              <a:buFont typeface="Arial"/>
+              <a:defRPr sz="1400" b="0" i="0" u="none" strike="noStrike" cap="none">
+                <a:solidFill>
+                  <a:srgbClr val="000000"/>
+                </a:solidFill>
+                <a:latin typeface="Arial"/>
+                <a:ea typeface="Arial"/>
+                <a:cs typeface="Arial"/>
+                <a:sym typeface="Arial"/>
+              </a:defRPr>
+            </a:lvl8pPr>
+            <a:lvl9pPr marR="0" lvl="8" algn="l" rtl="0">
+              <a:lnSpc>
+                <a:spcPct val="100000"/>
+              </a:lnSpc>
+              <a:spcBef>
+                <a:spcPts val="0"/>
+              </a:spcBef>
+              <a:spcAft>
+                <a:spcPts val="0"/>
+              </a:spcAft>
+              <a:buClr>
+                <a:srgbClr val="000000"/>
+              </a:buClr>
+              <a:buFont typeface="Arial"/>
+              <a:defRPr sz="1400" b="0" i="0" u="none" strike="noStrike" cap="none">
+                <a:solidFill>
+                  <a:srgbClr val="000000"/>
+                </a:solidFill>
+                <a:latin typeface="Arial"/>
+                <a:ea typeface="Arial"/>
+                <a:cs typeface="Arial"/>
+                <a:sym typeface="Arial"/>
+              </a:defRPr>
+            </a:lvl9pPr>
+          </a:lstStyle>
+          <a:p>
+            <a:pPr marL="8255" marR="3175"/>
+            <a:r>
+              <a:rPr lang="en-US" sz="4400" b="1">
+                <a:solidFill>
+                  <a:srgbClr val="3D3D3D"/>
+                </a:solidFill>
+                <a:latin typeface="Avenir Next LT Pro"/>
+              </a:rPr>
+              <a:t>AUTOSCALING</a:t>
+            </a:r>
+            <a:endParaRPr lang="en-US" sz="4400" b="1" dirty="0">
+              <a:solidFill>
+                <a:srgbClr val="3D3D3D"/>
+              </a:solidFill>
+              <a:latin typeface="Avenir Next LT Pro"/>
+            </a:endParaRPr>
+          </a:p>
+        </p:txBody>
+      </p:sp>
+      <p:sp>
+        <p:nvSpPr>
+          <p:cNvPr id="10" name="Google Shape;91;p17">
+            <a:extLst>
+              <a:ext uri="{FF2B5EF4-FFF2-40B4-BE49-F238E27FC236}">
+                <a16:creationId xmlns:a16="http://schemas.microsoft.com/office/drawing/2014/main" id="{9A378C68-A0E3-4E70-B83D-02E03DC76D8F}"/>
+              </a:ext>
+            </a:extLst>
+          </p:cNvPr>
+          <p:cNvSpPr/>
+          <p:nvPr/>
+        </p:nvSpPr>
+        <p:spPr>
+          <a:xfrm>
+            <a:off x="-1668" y="352471"/>
+            <a:ext cx="430272" cy="1259203"/>
+          </a:xfrm>
+          <a:custGeom>
+            <a:avLst/>
+            <a:gdLst/>
+            <a:ahLst/>
+            <a:cxnLst/>
+            <a:rect l="l" t="t" r="r" b="b"/>
+            <a:pathLst>
+              <a:path w="13563600" h="704850" extrusionOk="0">
+                <a:moveTo>
+                  <a:pt x="0" y="0"/>
+                </a:moveTo>
+                <a:lnTo>
+                  <a:pt x="13563600" y="0"/>
+                </a:lnTo>
+                <a:lnTo>
+                  <a:pt x="13563600" y="704850"/>
+                </a:lnTo>
+                <a:lnTo>
+                  <a:pt x="0" y="704850"/>
+                </a:lnTo>
+                <a:lnTo>
+                  <a:pt x="0" y="0"/>
+                </a:lnTo>
+                <a:close/>
+              </a:path>
+            </a:pathLst>
+          </a:custGeom>
+          <a:solidFill>
+            <a:srgbClr val="119981"/>
+          </a:solidFill>
+          <a:ln w="9525" cap="flat" cmpd="sng">
+            <a:solidFill>
+              <a:srgbClr val="119981"/>
+            </a:solidFill>
+            <a:prstDash val="solid"/>
+            <a:round/>
+            <a:headEnd type="none" w="sm" len="sm"/>
+            <a:tailEnd type="none" w="sm" len="sm"/>
+          </a:ln>
+          <a:effectLst>
+            <a:outerShdw blurRad="50800" dist="38100" dir="5400000" algn="t" rotWithShape="0">
+              <a:prstClr val="black">
+                <a:alpha val="40000"/>
+              </a:prstClr>
+            </a:outerShdw>
+          </a:effectLst>
+        </p:spPr>
+        <p:txBody>
+          <a:bodyPr spcFirstLastPara="1" wrap="square" lIns="0" tIns="0" rIns="0" bIns="0" anchor="t" anchorCtr="0">
+            <a:noAutofit/>
+          </a:bodyPr>
+          <a:lstStyle/>
+          <a:p>
+            <a:endParaRPr sz="1200">
+              <a:highlight>
+                <a:schemeClr val="lt1"/>
+              </a:highlight>
+            </a:endParaRPr>
+          </a:p>
+        </p:txBody>
+      </p:sp>
+    </p:spTree>
+    <p:extLst>
+      <p:ext uri="{BB962C8B-B14F-4D97-AF65-F5344CB8AC3E}">
+        <p14:creationId xmlns:p14="http://schemas.microsoft.com/office/powerpoint/2010/main" val="2564553590"/>
+      </p:ext>
+    </p:extLst>
+  </p:cSld>
+  <p:clrMapOvr>
+    <a:masterClrMapping/>
+  </p:clrMapOvr>
+</p:sld>
+</file>
+
+<file path=ppt/slides/slide21.xml><?xml version="1.0" encoding="utf-8"?>
+<p:sld xmlns:a="http://schemas.openxmlformats.org/drawingml/2006/main" xmlns:r="http://schemas.openxmlformats.org/officeDocument/2006/relationships" xmlns:p="http://schemas.openxmlformats.org/presentationml/2006/main">
+  <p:cSld>
+    <p:spTree>
+      <p:nvGrpSpPr>
+        <p:cNvPr id="1" name=""/>
+        <p:cNvGrpSpPr/>
+        <p:nvPr/>
+      </p:nvGrpSpPr>
+      <p:grpSpPr>
+        <a:xfrm>
+          <a:off x="0" y="0"/>
+          <a:ext cx="0" cy="0"/>
+          <a:chOff x="0" y="0"/>
+          <a:chExt cx="0" cy="0"/>
+        </a:xfrm>
+      </p:grpSpPr>
+      <p:sp>
+        <p:nvSpPr>
+          <p:cNvPr id="5" name="Content Placeholder 4">
+            <a:extLst>
+              <a:ext uri="{FF2B5EF4-FFF2-40B4-BE49-F238E27FC236}">
+                <a16:creationId xmlns:a16="http://schemas.microsoft.com/office/drawing/2014/main" id="{623EA3B1-5BDE-4815-9403-E17C025D51AC}"/>
+              </a:ext>
+            </a:extLst>
+          </p:cNvPr>
+          <p:cNvSpPr>
+            <a:spLocks noGrp="1"/>
+          </p:cNvSpPr>
+          <p:nvPr>
+            <p:ph idx="1"/>
+          </p:nvPr>
+        </p:nvSpPr>
+        <p:spPr>
+          <a:xfrm>
+            <a:off x="1328093" y="2540560"/>
+            <a:ext cx="10190252" cy="3135563"/>
+          </a:xfrm>
+        </p:spPr>
+        <p:txBody>
+          <a:bodyPr vert="horz" lIns="91440" tIns="45720" rIns="91440" bIns="45720" rtlCol="0" anchor="ctr">
+            <a:normAutofit/>
+          </a:bodyPr>
+          <a:lstStyle/>
+          <a:p>
+            <a:r>
+              <a:rPr lang="en-US" sz="2400">
+                <a:latin typeface="Avenir Next LT Pro"/>
+                <a:cs typeface="Calibri"/>
+              </a:rPr>
+              <a:t>Defining your spot pricing strategy </a:t>
+            </a:r>
+            <a:endParaRPr lang="en-US">
+              <a:latin typeface="Calibri" panose="020F0502020204030204"/>
+              <a:cs typeface="Calibri"/>
+            </a:endParaRPr>
+          </a:p>
+          <a:p>
+            <a:r>
+              <a:rPr lang="en-US" sz="2400">
+                <a:latin typeface="Avenir Next LT Pro"/>
+                <a:cs typeface="Calibri"/>
+              </a:rPr>
+              <a:t>Adding in cluster.yaml before deploy</a:t>
+            </a:r>
+            <a:endParaRPr lang="en-US">
+              <a:cs typeface="Calibri"/>
+            </a:endParaRPr>
+          </a:p>
+          <a:p>
+            <a:r>
+              <a:rPr lang="en-US" sz="2400">
+                <a:latin typeface="Avenir Next LT Pro"/>
+                <a:ea typeface="+mn-lt"/>
+                <a:cs typeface="+mn-lt"/>
+              </a:rPr>
+              <a:t>Applying spot-interrupt-handler yaml into cluster after deploy</a:t>
+            </a:r>
+            <a:endParaRPr lang="en-US" sz="2400" dirty="0">
+              <a:latin typeface="Avenir Next LT Pro"/>
+              <a:ea typeface="+mn-lt"/>
+              <a:cs typeface="+mn-lt"/>
+            </a:endParaRPr>
+          </a:p>
+          <a:p>
+            <a:r>
+              <a:rPr lang="en-US" sz="2400" dirty="0">
+                <a:latin typeface="Avenir Next LT Pro"/>
+                <a:cs typeface="Calibri"/>
+              </a:rPr>
+              <a:t>https://www.eksworkshop.com/beginner/150_spotworkers/deployhandler/</a:t>
+            </a:r>
+            <a:endParaRPr lang="en-US" sz="2400">
+              <a:ea typeface="+mn-lt"/>
+              <a:cs typeface="+mn-lt"/>
+            </a:endParaRPr>
+          </a:p>
+          <a:p>
+            <a:r>
+              <a:rPr lang="en-US" sz="2400" dirty="0">
+                <a:latin typeface="Avenir Next LT Pro"/>
+                <a:cs typeface="Calibri"/>
+              </a:rPr>
+              <a:t>https://aws.amazon.com/ec2/spot/pricing/</a:t>
+            </a:r>
+            <a:endParaRPr lang="en-US" sz="2400">
+              <a:ea typeface="+mn-lt"/>
+              <a:cs typeface="+mn-lt"/>
+            </a:endParaRPr>
+          </a:p>
+          <a:p>
+            <a:r>
+              <a:rPr lang="en-US" sz="2400" dirty="0">
+                <a:latin typeface="Avenir Next LT Pro"/>
+                <a:cs typeface="Calibri"/>
+              </a:rPr>
+              <a:t>https://aws.amazon.com/ec2/pricing/on-demand/</a:t>
+            </a:r>
+            <a:endParaRPr lang="en-US"/>
+          </a:p>
+          <a:p>
+            <a:endParaRPr lang="en-US" sz="2400">
+              <a:latin typeface="Avenir Next LT Pro"/>
+              <a:cs typeface="Calibri"/>
+            </a:endParaRPr>
+          </a:p>
+          <a:p>
+            <a:endParaRPr lang="en-US" sz="2400" dirty="0">
+              <a:latin typeface="Avenir Next LT Pro"/>
+              <a:cs typeface="Calibri"/>
+            </a:endParaRPr>
+          </a:p>
+        </p:txBody>
+      </p:sp>
+      <p:pic>
+        <p:nvPicPr>
+          <p:cNvPr id="3" name="Graphic 2">
+            <a:extLst>
+              <a:ext uri="{FF2B5EF4-FFF2-40B4-BE49-F238E27FC236}">
+                <a16:creationId xmlns:a16="http://schemas.microsoft.com/office/drawing/2014/main" id="{D2B5E6DC-E98E-4A63-A659-49462A776E30}"/>
+              </a:ext>
+            </a:extLst>
+          </p:cNvPr>
+          <p:cNvPicPr>
+            <a:picLocks noChangeAspect="1"/>
+          </p:cNvPicPr>
+          <p:nvPr/>
+        </p:nvPicPr>
+        <p:blipFill>
+          <a:blip r:embed="rId2">
+            <a:extLst>
+              <a:ext uri="{96DAC541-7B7A-43D3-8B79-37D633B846F1}">
+                <asvg:svgBlip xmlns:asvg="http://schemas.microsoft.com/office/drawing/2016/SVG/main" r:embed="rId3"/>
+              </a:ext>
+            </a:extLst>
+          </a:blip>
+          <a:stretch>
+            <a:fillRect/>
+          </a:stretch>
+        </p:blipFill>
+        <p:spPr>
+          <a:xfrm>
+            <a:off x="537714" y="5639735"/>
+            <a:ext cx="2332007" cy="941285"/>
+          </a:xfrm>
+          <a:prstGeom prst="rect">
+            <a:avLst/>
+          </a:prstGeom>
+        </p:spPr>
+      </p:pic>
+      <p:sp>
+        <p:nvSpPr>
+          <p:cNvPr id="4" name="Google Shape;320;p28">
+            <a:extLst>
+              <a:ext uri="{FF2B5EF4-FFF2-40B4-BE49-F238E27FC236}">
+                <a16:creationId xmlns:a16="http://schemas.microsoft.com/office/drawing/2014/main" id="{23696608-BF4E-41BB-B759-8614FFD4C6C3}"/>
+              </a:ext>
+            </a:extLst>
+          </p:cNvPr>
+          <p:cNvSpPr txBox="1">
+            <a:spLocks/>
+          </p:cNvSpPr>
+          <p:nvPr/>
+        </p:nvSpPr>
+        <p:spPr>
+          <a:xfrm>
+            <a:off x="609953" y="628540"/>
+            <a:ext cx="10646179" cy="1151043"/>
+          </a:xfrm>
+          <a:prstGeom prst="rect">
+            <a:avLst/>
+          </a:prstGeom>
+          <a:noFill/>
+          <a:ln>
+            <a:noFill/>
+          </a:ln>
+        </p:spPr>
+        <p:txBody>
+          <a:bodyPr spcFirstLastPara="1" wrap="square" lIns="0" tIns="30050" rIns="0" bIns="0" anchor="t" anchorCtr="0">
+            <a:noAutofit/>
+          </a:bodyPr>
+          <a:lstStyle>
+            <a:defPPr marR="0" lvl="0" algn="l" rtl="0">
+              <a:lnSpc>
+                <a:spcPct val="100000"/>
+              </a:lnSpc>
+              <a:spcBef>
+                <a:spcPts val="0"/>
+              </a:spcBef>
+              <a:spcAft>
+                <a:spcPts val="0"/>
+              </a:spcAft>
+            </a:defPPr>
+            <a:lvl1pPr marR="0" lvl="0" algn="l" rtl="0">
+              <a:lnSpc>
+                <a:spcPct val="100000"/>
+              </a:lnSpc>
+              <a:spcBef>
+                <a:spcPts val="0"/>
+              </a:spcBef>
+              <a:spcAft>
+                <a:spcPts val="0"/>
+              </a:spcAft>
+              <a:buClr>
+                <a:srgbClr val="000000"/>
+              </a:buClr>
+              <a:buFont typeface="Arial"/>
+              <a:defRPr sz="1400" b="0" i="0" u="none" strike="noStrike" cap="none">
+                <a:solidFill>
+                  <a:srgbClr val="000000"/>
+                </a:solidFill>
+                <a:latin typeface="Arial"/>
+                <a:ea typeface="Arial"/>
+                <a:cs typeface="Arial"/>
+                <a:sym typeface="Arial"/>
+              </a:defRPr>
+            </a:lvl1pPr>
+            <a:lvl2pPr marR="0" lvl="1" algn="l" rtl="0">
+              <a:lnSpc>
+                <a:spcPct val="100000"/>
+              </a:lnSpc>
+              <a:spcBef>
+                <a:spcPts val="0"/>
+              </a:spcBef>
+              <a:spcAft>
+                <a:spcPts val="0"/>
+              </a:spcAft>
+              <a:buClr>
+                <a:srgbClr val="000000"/>
+              </a:buClr>
+              <a:buFont typeface="Arial"/>
+              <a:defRPr sz="1400" b="0" i="0" u="none" strike="noStrike" cap="none">
+                <a:solidFill>
+                  <a:srgbClr val="000000"/>
+                </a:solidFill>
+                <a:latin typeface="Arial"/>
+                <a:ea typeface="Arial"/>
+                <a:cs typeface="Arial"/>
+                <a:sym typeface="Arial"/>
+              </a:defRPr>
+            </a:lvl2pPr>
+            <a:lvl3pPr marR="0" lvl="2" algn="l" rtl="0">
+              <a:lnSpc>
+                <a:spcPct val="100000"/>
+              </a:lnSpc>
+              <a:spcBef>
+                <a:spcPts val="0"/>
+              </a:spcBef>
+              <a:spcAft>
+                <a:spcPts val="0"/>
+              </a:spcAft>
+              <a:buClr>
+                <a:srgbClr val="000000"/>
+              </a:buClr>
+              <a:buFont typeface="Arial"/>
+              <a:defRPr sz="1400" b="0" i="0" u="none" strike="noStrike" cap="none">
+                <a:solidFill>
+                  <a:srgbClr val="000000"/>
+                </a:solidFill>
+                <a:latin typeface="Arial"/>
+                <a:ea typeface="Arial"/>
+                <a:cs typeface="Arial"/>
+                <a:sym typeface="Arial"/>
+              </a:defRPr>
+            </a:lvl3pPr>
+            <a:lvl4pPr marR="0" lvl="3" algn="l" rtl="0">
+              <a:lnSpc>
+                <a:spcPct val="100000"/>
+              </a:lnSpc>
+              <a:spcBef>
+                <a:spcPts val="0"/>
+              </a:spcBef>
+              <a:spcAft>
+                <a:spcPts val="0"/>
+              </a:spcAft>
+              <a:buClr>
+                <a:srgbClr val="000000"/>
+              </a:buClr>
+              <a:buFont typeface="Arial"/>
+              <a:defRPr sz="1400" b="0" i="0" u="none" strike="noStrike" cap="none">
+                <a:solidFill>
+                  <a:srgbClr val="000000"/>
+                </a:solidFill>
+                <a:latin typeface="Arial"/>
+                <a:ea typeface="Arial"/>
+                <a:cs typeface="Arial"/>
+                <a:sym typeface="Arial"/>
+              </a:defRPr>
+            </a:lvl4pPr>
+            <a:lvl5pPr marR="0" lvl="4" algn="l" rtl="0">
+              <a:lnSpc>
+                <a:spcPct val="100000"/>
+              </a:lnSpc>
+              <a:spcBef>
+                <a:spcPts val="0"/>
+              </a:spcBef>
+              <a:spcAft>
+                <a:spcPts val="0"/>
+              </a:spcAft>
+              <a:buClr>
+                <a:srgbClr val="000000"/>
+              </a:buClr>
+              <a:buFont typeface="Arial"/>
+              <a:defRPr sz="1400" b="0" i="0" u="none" strike="noStrike" cap="none">
+                <a:solidFill>
+                  <a:srgbClr val="000000"/>
+                </a:solidFill>
+                <a:latin typeface="Arial"/>
+                <a:ea typeface="Arial"/>
+                <a:cs typeface="Arial"/>
+                <a:sym typeface="Arial"/>
+              </a:defRPr>
+            </a:lvl5pPr>
+            <a:lvl6pPr marR="0" lvl="5" algn="l" rtl="0">
+              <a:lnSpc>
+                <a:spcPct val="100000"/>
+              </a:lnSpc>
+              <a:spcBef>
+                <a:spcPts val="0"/>
+              </a:spcBef>
+              <a:spcAft>
+                <a:spcPts val="0"/>
+              </a:spcAft>
+              <a:buClr>
+                <a:srgbClr val="000000"/>
+              </a:buClr>
+              <a:buFont typeface="Arial"/>
+              <a:defRPr sz="1400" b="0" i="0" u="none" strike="noStrike" cap="none">
+                <a:solidFill>
+                  <a:srgbClr val="000000"/>
+                </a:solidFill>
+                <a:latin typeface="Arial"/>
+                <a:ea typeface="Arial"/>
+                <a:cs typeface="Arial"/>
+                <a:sym typeface="Arial"/>
+              </a:defRPr>
+            </a:lvl6pPr>
+            <a:lvl7pPr marR="0" lvl="6" algn="l" rtl="0">
+              <a:lnSpc>
+                <a:spcPct val="100000"/>
+              </a:lnSpc>
+              <a:spcBef>
+                <a:spcPts val="0"/>
+              </a:spcBef>
+              <a:spcAft>
+                <a:spcPts val="0"/>
+              </a:spcAft>
+              <a:buClr>
+                <a:srgbClr val="000000"/>
+              </a:buClr>
+              <a:buFont typeface="Arial"/>
+              <a:defRPr sz="1400" b="0" i="0" u="none" strike="noStrike" cap="none">
+                <a:solidFill>
+                  <a:srgbClr val="000000"/>
+                </a:solidFill>
+                <a:latin typeface="Arial"/>
+                <a:ea typeface="Arial"/>
+                <a:cs typeface="Arial"/>
+                <a:sym typeface="Arial"/>
+              </a:defRPr>
+            </a:lvl7pPr>
+            <a:lvl8pPr marR="0" lvl="7" algn="l" rtl="0">
+              <a:lnSpc>
+                <a:spcPct val="100000"/>
+              </a:lnSpc>
+              <a:spcBef>
+                <a:spcPts val="0"/>
+              </a:spcBef>
+              <a:spcAft>
+                <a:spcPts val="0"/>
+              </a:spcAft>
+              <a:buClr>
+                <a:srgbClr val="000000"/>
+              </a:buClr>
+              <a:buFont typeface="Arial"/>
+              <a:defRPr sz="1400" b="0" i="0" u="none" strike="noStrike" cap="none">
+                <a:solidFill>
+                  <a:srgbClr val="000000"/>
+                </a:solidFill>
+                <a:latin typeface="Arial"/>
+                <a:ea typeface="Arial"/>
+                <a:cs typeface="Arial"/>
+                <a:sym typeface="Arial"/>
+              </a:defRPr>
+            </a:lvl8pPr>
+            <a:lvl9pPr marR="0" lvl="8" algn="l" rtl="0">
+              <a:lnSpc>
+                <a:spcPct val="100000"/>
+              </a:lnSpc>
+              <a:spcBef>
+                <a:spcPts val="0"/>
+              </a:spcBef>
+              <a:spcAft>
+                <a:spcPts val="0"/>
+              </a:spcAft>
+              <a:buClr>
+                <a:srgbClr val="000000"/>
+              </a:buClr>
+              <a:buFont typeface="Arial"/>
+              <a:defRPr sz="1400" b="0" i="0" u="none" strike="noStrike" cap="none">
+                <a:solidFill>
+                  <a:srgbClr val="000000"/>
+                </a:solidFill>
+                <a:latin typeface="Arial"/>
+                <a:ea typeface="Arial"/>
+                <a:cs typeface="Arial"/>
+                <a:sym typeface="Arial"/>
+              </a:defRPr>
+            </a:lvl9pPr>
+          </a:lstStyle>
+          <a:p>
+            <a:pPr marL="8255" marR="3175"/>
+            <a:r>
+              <a:rPr lang="en-US" sz="4400" b="1">
+                <a:solidFill>
+                  <a:srgbClr val="3D3D3D"/>
+                </a:solidFill>
+                <a:latin typeface="Avenir Next LT Pro"/>
+              </a:rPr>
+              <a:t>Spot Interrupt Handlers</a:t>
+            </a:r>
+            <a:endParaRPr lang="en-US" sz="4400" b="1" dirty="0">
+              <a:solidFill>
+                <a:srgbClr val="3D3D3D"/>
+              </a:solidFill>
+              <a:latin typeface="Avenir Next LT Pro"/>
+            </a:endParaRPr>
+          </a:p>
+        </p:txBody>
+      </p:sp>
+      <p:sp>
+        <p:nvSpPr>
+          <p:cNvPr id="10" name="Google Shape;91;p17">
+            <a:extLst>
+              <a:ext uri="{FF2B5EF4-FFF2-40B4-BE49-F238E27FC236}">
+                <a16:creationId xmlns:a16="http://schemas.microsoft.com/office/drawing/2014/main" id="{9A378C68-A0E3-4E70-B83D-02E03DC76D8F}"/>
+              </a:ext>
+            </a:extLst>
+          </p:cNvPr>
+          <p:cNvSpPr/>
+          <p:nvPr/>
+        </p:nvSpPr>
+        <p:spPr>
+          <a:xfrm>
+            <a:off x="-1668" y="352471"/>
+            <a:ext cx="430272" cy="1259203"/>
+          </a:xfrm>
+          <a:custGeom>
+            <a:avLst/>
+            <a:gdLst/>
+            <a:ahLst/>
+            <a:cxnLst/>
+            <a:rect l="l" t="t" r="r" b="b"/>
+            <a:pathLst>
+              <a:path w="13563600" h="704850" extrusionOk="0">
+                <a:moveTo>
+                  <a:pt x="0" y="0"/>
+                </a:moveTo>
+                <a:lnTo>
+                  <a:pt x="13563600" y="0"/>
+                </a:lnTo>
+                <a:lnTo>
+                  <a:pt x="13563600" y="704850"/>
+                </a:lnTo>
+                <a:lnTo>
+                  <a:pt x="0" y="704850"/>
+                </a:lnTo>
+                <a:lnTo>
+                  <a:pt x="0" y="0"/>
+                </a:lnTo>
+                <a:close/>
+              </a:path>
+            </a:pathLst>
+          </a:custGeom>
+          <a:solidFill>
+            <a:srgbClr val="119981"/>
+          </a:solidFill>
+          <a:ln w="9525" cap="flat" cmpd="sng">
+            <a:solidFill>
+              <a:srgbClr val="119981"/>
+            </a:solidFill>
+            <a:prstDash val="solid"/>
+            <a:round/>
+            <a:headEnd type="none" w="sm" len="sm"/>
+            <a:tailEnd type="none" w="sm" len="sm"/>
+          </a:ln>
+          <a:effectLst>
+            <a:outerShdw blurRad="50800" dist="38100" dir="5400000" algn="t" rotWithShape="0">
+              <a:prstClr val="black">
+                <a:alpha val="40000"/>
+              </a:prstClr>
+            </a:outerShdw>
+          </a:effectLst>
+        </p:spPr>
+        <p:txBody>
+          <a:bodyPr spcFirstLastPara="1" wrap="square" lIns="0" tIns="0" rIns="0" bIns="0" anchor="t" anchorCtr="0">
+            <a:noAutofit/>
+          </a:bodyPr>
+          <a:lstStyle/>
+          <a:p>
+            <a:endParaRPr sz="1200">
+              <a:highlight>
+                <a:schemeClr val="lt1"/>
+              </a:highlight>
+            </a:endParaRPr>
+          </a:p>
+        </p:txBody>
+      </p:sp>
+    </p:spTree>
+    <p:extLst>
+      <p:ext uri="{BB962C8B-B14F-4D97-AF65-F5344CB8AC3E}">
+        <p14:creationId xmlns:p14="http://schemas.microsoft.com/office/powerpoint/2010/main" val="3447587128"/>
+      </p:ext>
+    </p:extLst>
+  </p:cSld>
+  <p:clrMapOvr>
+    <a:masterClrMapping/>
+  </p:clrMapOvr>
+</p:sld>
+</file>
+
+<file path=ppt/slides/slide22.xml><?xml version="1.0" encoding="utf-8"?>
+<p:sld xmlns:a="http://schemas.openxmlformats.org/drawingml/2006/main" xmlns:r="http://schemas.openxmlformats.org/officeDocument/2006/relationships" xmlns:p="http://schemas.openxmlformats.org/presentationml/2006/main">
+  <p:cSld>
+    <p:spTree>
+      <p:nvGrpSpPr>
+        <p:cNvPr id="1" name=""/>
+        <p:cNvGrpSpPr/>
+        <p:nvPr/>
+      </p:nvGrpSpPr>
+      <p:grpSpPr>
+        <a:xfrm>
+          <a:off x="0" y="0"/>
+          <a:ext cx="0" cy="0"/>
+          <a:chOff x="0" y="0"/>
+          <a:chExt cx="0" cy="0"/>
+        </a:xfrm>
+      </p:grpSpPr>
+      <p:sp>
+        <p:nvSpPr>
+          <p:cNvPr id="5" name="Content Placeholder 4">
+            <a:extLst>
+              <a:ext uri="{FF2B5EF4-FFF2-40B4-BE49-F238E27FC236}">
+                <a16:creationId xmlns:a16="http://schemas.microsoft.com/office/drawing/2014/main" id="{623EA3B1-5BDE-4815-9403-E17C025D51AC}"/>
+              </a:ext>
+            </a:extLst>
+          </p:cNvPr>
+          <p:cNvSpPr>
+            <a:spLocks noGrp="1"/>
+          </p:cNvSpPr>
+          <p:nvPr>
+            <p:ph idx="1"/>
+          </p:nvPr>
+        </p:nvSpPr>
+        <p:spPr>
+          <a:xfrm>
+            <a:off x="3390948" y="2070615"/>
+            <a:ext cx="7071172" cy="2844462"/>
+          </a:xfrm>
+        </p:spPr>
+        <p:txBody>
+          <a:bodyPr vert="horz" lIns="91440" tIns="45720" rIns="91440" bIns="45720" rtlCol="0" anchor="t">
+            <a:normAutofit/>
+          </a:bodyPr>
+          <a:lstStyle/>
+          <a:p>
+            <a:r>
+              <a:rPr lang="en-US" sz="2400" dirty="0" err="1">
+                <a:solidFill>
+                  <a:schemeClr val="bg2">
+                    <a:lumMod val="25000"/>
+                  </a:schemeClr>
+                </a:solidFill>
+                <a:latin typeface="Avenir Next LT Pro"/>
+                <a:cs typeface="Calibri"/>
+              </a:rPr>
+              <a:t>Eksctl</a:t>
+            </a:r>
+            <a:r>
+              <a:rPr lang="en-US" sz="2400" dirty="0">
+                <a:solidFill>
+                  <a:schemeClr val="bg2">
+                    <a:lumMod val="25000"/>
+                  </a:schemeClr>
+                </a:solidFill>
+                <a:latin typeface="Avenir Next LT Pro"/>
+                <a:cs typeface="Calibri"/>
+              </a:rPr>
+              <a:t> commands</a:t>
+            </a:r>
+          </a:p>
+          <a:p>
+            <a:r>
+              <a:rPr lang="en-US" sz="2400" dirty="0" err="1">
+                <a:solidFill>
+                  <a:schemeClr val="bg2">
+                    <a:lumMod val="25000"/>
+                  </a:schemeClr>
+                </a:solidFill>
+                <a:latin typeface="Avenir Next LT Pro"/>
+                <a:cs typeface="Calibri"/>
+              </a:rPr>
+              <a:t>Kubectl</a:t>
+            </a:r>
+            <a:r>
+              <a:rPr lang="en-US" sz="2400" dirty="0">
+                <a:solidFill>
+                  <a:schemeClr val="bg2">
+                    <a:lumMod val="25000"/>
+                  </a:schemeClr>
+                </a:solidFill>
+                <a:latin typeface="Avenir Next LT Pro"/>
+                <a:cs typeface="Calibri"/>
+              </a:rPr>
+              <a:t> commands</a:t>
+            </a:r>
+          </a:p>
+          <a:p>
+            <a:r>
+              <a:rPr lang="en-US" sz="2400" dirty="0">
+                <a:solidFill>
+                  <a:schemeClr val="bg2">
+                    <a:lumMod val="25000"/>
+                  </a:schemeClr>
+                </a:solidFill>
+                <a:latin typeface="Avenir Next LT Pro"/>
+                <a:cs typeface="Calibri"/>
+              </a:rPr>
+              <a:t>Observing autoscaling and </a:t>
+            </a:r>
+            <a:r>
+              <a:rPr lang="en-US" sz="2400" dirty="0" err="1">
+                <a:solidFill>
+                  <a:schemeClr val="bg2">
+                    <a:lumMod val="25000"/>
+                  </a:schemeClr>
+                </a:solidFill>
+                <a:latin typeface="Avenir Next LT Pro"/>
+                <a:cs typeface="Calibri"/>
+              </a:rPr>
+              <a:t>nodegroup</a:t>
+            </a:r>
+            <a:r>
+              <a:rPr lang="en-US" sz="2400" dirty="0">
+                <a:solidFill>
+                  <a:schemeClr val="bg2">
+                    <a:lumMod val="25000"/>
+                  </a:schemeClr>
+                </a:solidFill>
+                <a:latin typeface="Avenir Next LT Pro"/>
+                <a:cs typeface="Calibri"/>
+              </a:rPr>
+              <a:t> information from AWS console</a:t>
+            </a:r>
+          </a:p>
+          <a:p>
+            <a:r>
+              <a:rPr lang="en-US" sz="2400" dirty="0">
+                <a:solidFill>
+                  <a:schemeClr val="bg2">
+                    <a:lumMod val="25000"/>
+                  </a:schemeClr>
+                </a:solidFill>
+                <a:latin typeface="Avenir Next LT Pro"/>
+                <a:cs typeface="Calibri"/>
+              </a:rPr>
+              <a:t>Enabling </a:t>
+            </a:r>
+            <a:r>
+              <a:rPr lang="en-US" sz="2400" dirty="0" err="1">
+                <a:solidFill>
+                  <a:schemeClr val="bg2">
+                    <a:lumMod val="25000"/>
+                  </a:schemeClr>
+                </a:solidFill>
+                <a:latin typeface="Avenir Next LT Pro"/>
+                <a:cs typeface="Calibri"/>
+              </a:rPr>
+              <a:t>Cloudwatch</a:t>
+            </a:r>
+            <a:r>
+              <a:rPr lang="en-US" sz="2400" dirty="0">
+                <a:solidFill>
+                  <a:schemeClr val="bg2">
+                    <a:lumMod val="25000"/>
+                  </a:schemeClr>
+                </a:solidFill>
+                <a:latin typeface="Avenir Next LT Pro"/>
+                <a:cs typeface="Calibri"/>
+              </a:rPr>
+              <a:t> logging for EKS</a:t>
+            </a:r>
+          </a:p>
+        </p:txBody>
+      </p:sp>
+      <p:pic>
+        <p:nvPicPr>
+          <p:cNvPr id="3" name="Graphic 2">
+            <a:extLst>
+              <a:ext uri="{FF2B5EF4-FFF2-40B4-BE49-F238E27FC236}">
+                <a16:creationId xmlns:a16="http://schemas.microsoft.com/office/drawing/2014/main" id="{84FAEA61-DFE3-4F57-A345-4DC9C06CBF5B}"/>
+              </a:ext>
+            </a:extLst>
+          </p:cNvPr>
+          <p:cNvPicPr>
+            <a:picLocks noChangeAspect="1"/>
+          </p:cNvPicPr>
+          <p:nvPr/>
+        </p:nvPicPr>
+        <p:blipFill>
+          <a:blip r:embed="rId2">
+            <a:extLst>
+              <a:ext uri="{96DAC541-7B7A-43D3-8B79-37D633B846F1}">
+                <asvg:svgBlip xmlns:asvg="http://schemas.microsoft.com/office/drawing/2016/SVG/main" r:embed="rId3"/>
+              </a:ext>
+            </a:extLst>
+          </a:blip>
+          <a:stretch>
+            <a:fillRect/>
+          </a:stretch>
+        </p:blipFill>
+        <p:spPr>
+          <a:xfrm>
+            <a:off x="537714" y="5639735"/>
+            <a:ext cx="2332007" cy="941285"/>
+          </a:xfrm>
+          <a:prstGeom prst="rect">
+            <a:avLst/>
+          </a:prstGeom>
+        </p:spPr>
+      </p:pic>
+      <p:sp>
+        <p:nvSpPr>
+          <p:cNvPr id="6" name="Google Shape;91;p17">
+            <a:extLst>
+              <a:ext uri="{FF2B5EF4-FFF2-40B4-BE49-F238E27FC236}">
+                <a16:creationId xmlns:a16="http://schemas.microsoft.com/office/drawing/2014/main" id="{CE6767B9-3F66-45F5-8634-EB41A9C08103}"/>
+              </a:ext>
+            </a:extLst>
+          </p:cNvPr>
+          <p:cNvSpPr/>
+          <p:nvPr/>
+        </p:nvSpPr>
+        <p:spPr>
+          <a:xfrm>
+            <a:off x="3520" y="370556"/>
+            <a:ext cx="487258" cy="1342465"/>
+          </a:xfrm>
+          <a:custGeom>
+            <a:avLst/>
+            <a:gdLst/>
+            <a:ahLst/>
+            <a:cxnLst/>
+            <a:rect l="l" t="t" r="r" b="b"/>
+            <a:pathLst>
+              <a:path w="13563600" h="704850" extrusionOk="0">
+                <a:moveTo>
+                  <a:pt x="0" y="0"/>
+                </a:moveTo>
+                <a:lnTo>
+                  <a:pt x="13563600" y="0"/>
+                </a:lnTo>
+                <a:lnTo>
+                  <a:pt x="13563600" y="704850"/>
+                </a:lnTo>
+                <a:lnTo>
+                  <a:pt x="0" y="704850"/>
+                </a:lnTo>
+                <a:lnTo>
+                  <a:pt x="0" y="0"/>
+                </a:lnTo>
+                <a:close/>
+              </a:path>
+            </a:pathLst>
+          </a:custGeom>
+          <a:solidFill>
+            <a:srgbClr val="119981"/>
+          </a:solidFill>
+          <a:ln w="9525" cap="flat" cmpd="sng">
+            <a:solidFill>
+              <a:srgbClr val="119981"/>
+            </a:solidFill>
+            <a:prstDash val="solid"/>
+            <a:round/>
+            <a:headEnd type="none" w="sm" len="sm"/>
+            <a:tailEnd type="none" w="sm" len="sm"/>
+          </a:ln>
+          <a:effectLst>
+            <a:outerShdw blurRad="50800" dist="38100" dir="5400000" algn="t" rotWithShape="0">
+              <a:prstClr val="black">
+                <a:alpha val="40000"/>
+              </a:prstClr>
+            </a:outerShdw>
+          </a:effectLst>
+        </p:spPr>
+        <p:txBody>
+          <a:bodyPr spcFirstLastPara="1" wrap="square" lIns="0" tIns="0" rIns="0" bIns="0" anchor="t" anchorCtr="0">
+            <a:noAutofit/>
+          </a:bodyPr>
+          <a:lstStyle>
+            <a:defPPr marR="0" lvl="0" algn="l" rtl="0">
+              <a:lnSpc>
+                <a:spcPct val="100000"/>
+              </a:lnSpc>
+              <a:spcBef>
+                <a:spcPts val="0"/>
+              </a:spcBef>
+              <a:spcAft>
+                <a:spcPts val="0"/>
+              </a:spcAft>
+            </a:defPPr>
+            <a:lvl1pPr marR="0" lvl="0" algn="l" rtl="0">
+              <a:lnSpc>
+                <a:spcPct val="100000"/>
+              </a:lnSpc>
+              <a:spcBef>
+                <a:spcPts val="0"/>
+              </a:spcBef>
+              <a:spcAft>
+                <a:spcPts val="0"/>
+              </a:spcAft>
+              <a:buClr>
+                <a:srgbClr val="000000"/>
+              </a:buClr>
+              <a:buFont typeface="Arial"/>
+              <a:defRPr sz="1400" b="0" i="0" u="none" strike="noStrike" cap="none">
+                <a:solidFill>
+                  <a:srgbClr val="000000"/>
+                </a:solidFill>
+                <a:latin typeface="Arial"/>
+                <a:ea typeface="Arial"/>
+                <a:cs typeface="Arial"/>
+                <a:sym typeface="Arial"/>
+              </a:defRPr>
+            </a:lvl1pPr>
+            <a:lvl2pPr marR="0" lvl="1" algn="l" rtl="0">
+              <a:lnSpc>
+                <a:spcPct val="100000"/>
+              </a:lnSpc>
+              <a:spcBef>
+                <a:spcPts val="0"/>
+              </a:spcBef>
+              <a:spcAft>
+                <a:spcPts val="0"/>
+              </a:spcAft>
+              <a:buClr>
+                <a:srgbClr val="000000"/>
+              </a:buClr>
+              <a:buFont typeface="Arial"/>
+              <a:defRPr sz="1400" b="0" i="0" u="none" strike="noStrike" cap="none">
+                <a:solidFill>
+                  <a:srgbClr val="000000"/>
+                </a:solidFill>
+                <a:latin typeface="Arial"/>
+                <a:ea typeface="Arial"/>
+                <a:cs typeface="Arial"/>
+                <a:sym typeface="Arial"/>
+              </a:defRPr>
+            </a:lvl2pPr>
+            <a:lvl3pPr marR="0" lvl="2" algn="l" rtl="0">
+              <a:lnSpc>
+                <a:spcPct val="100000"/>
+              </a:lnSpc>
+              <a:spcBef>
+                <a:spcPts val="0"/>
+              </a:spcBef>
+              <a:spcAft>
+                <a:spcPts val="0"/>
+              </a:spcAft>
+              <a:buClr>
+                <a:srgbClr val="000000"/>
+              </a:buClr>
+              <a:buFont typeface="Arial"/>
+              <a:defRPr sz="1400" b="0" i="0" u="none" strike="noStrike" cap="none">
+                <a:solidFill>
+                  <a:srgbClr val="000000"/>
+                </a:solidFill>
+                <a:latin typeface="Arial"/>
+                <a:ea typeface="Arial"/>
+                <a:cs typeface="Arial"/>
+                <a:sym typeface="Arial"/>
+              </a:defRPr>
+            </a:lvl3pPr>
+            <a:lvl4pPr marR="0" lvl="3" algn="l" rtl="0">
+              <a:lnSpc>
+                <a:spcPct val="100000"/>
+              </a:lnSpc>
+              <a:spcBef>
+                <a:spcPts val="0"/>
+              </a:spcBef>
+              <a:spcAft>
+                <a:spcPts val="0"/>
+              </a:spcAft>
+              <a:buClr>
+                <a:srgbClr val="000000"/>
+              </a:buClr>
+              <a:buFont typeface="Arial"/>
+              <a:defRPr sz="1400" b="0" i="0" u="none" strike="noStrike" cap="none">
+                <a:solidFill>
+                  <a:srgbClr val="000000"/>
+                </a:solidFill>
+                <a:latin typeface="Arial"/>
+                <a:ea typeface="Arial"/>
+                <a:cs typeface="Arial"/>
+                <a:sym typeface="Arial"/>
+              </a:defRPr>
+            </a:lvl4pPr>
+            <a:lvl5pPr marR="0" lvl="4" algn="l" rtl="0">
+              <a:lnSpc>
+                <a:spcPct val="100000"/>
+              </a:lnSpc>
+              <a:spcBef>
+                <a:spcPts val="0"/>
+              </a:spcBef>
+              <a:spcAft>
+                <a:spcPts val="0"/>
+              </a:spcAft>
+              <a:buClr>
+                <a:srgbClr val="000000"/>
+              </a:buClr>
+              <a:buFont typeface="Arial"/>
+              <a:defRPr sz="1400" b="0" i="0" u="none" strike="noStrike" cap="none">
+                <a:solidFill>
+                  <a:srgbClr val="000000"/>
+                </a:solidFill>
+                <a:latin typeface="Arial"/>
+                <a:ea typeface="Arial"/>
+                <a:cs typeface="Arial"/>
+                <a:sym typeface="Arial"/>
+              </a:defRPr>
+            </a:lvl5pPr>
+            <a:lvl6pPr marR="0" lvl="5" algn="l" rtl="0">
+              <a:lnSpc>
+                <a:spcPct val="100000"/>
+              </a:lnSpc>
+              <a:spcBef>
+                <a:spcPts val="0"/>
+              </a:spcBef>
+              <a:spcAft>
+                <a:spcPts val="0"/>
+              </a:spcAft>
+              <a:buClr>
+                <a:srgbClr val="000000"/>
+              </a:buClr>
+              <a:buFont typeface="Arial"/>
+              <a:defRPr sz="1400" b="0" i="0" u="none" strike="noStrike" cap="none">
+                <a:solidFill>
+                  <a:srgbClr val="000000"/>
+                </a:solidFill>
+                <a:latin typeface="Arial"/>
+                <a:ea typeface="Arial"/>
+                <a:cs typeface="Arial"/>
+                <a:sym typeface="Arial"/>
+              </a:defRPr>
+            </a:lvl6pPr>
+            <a:lvl7pPr marR="0" lvl="6" algn="l" rtl="0">
+              <a:lnSpc>
+                <a:spcPct val="100000"/>
+              </a:lnSpc>
+              <a:spcBef>
+                <a:spcPts val="0"/>
+              </a:spcBef>
+              <a:spcAft>
+                <a:spcPts val="0"/>
+              </a:spcAft>
+              <a:buClr>
+                <a:srgbClr val="000000"/>
+              </a:buClr>
+              <a:buFont typeface="Arial"/>
+              <a:defRPr sz="1400" b="0" i="0" u="none" strike="noStrike" cap="none">
+                <a:solidFill>
+                  <a:srgbClr val="000000"/>
+                </a:solidFill>
+                <a:latin typeface="Arial"/>
+                <a:ea typeface="Arial"/>
+                <a:cs typeface="Arial"/>
+                <a:sym typeface="Arial"/>
+              </a:defRPr>
+            </a:lvl7pPr>
+            <a:lvl8pPr marR="0" lvl="7" algn="l" rtl="0">
+              <a:lnSpc>
+                <a:spcPct val="100000"/>
+              </a:lnSpc>
+              <a:spcBef>
+                <a:spcPts val="0"/>
+              </a:spcBef>
+              <a:spcAft>
+                <a:spcPts val="0"/>
+              </a:spcAft>
+              <a:buClr>
+                <a:srgbClr val="000000"/>
+              </a:buClr>
+              <a:buFont typeface="Arial"/>
+              <a:defRPr sz="1400" b="0" i="0" u="none" strike="noStrike" cap="none">
+                <a:solidFill>
+                  <a:srgbClr val="000000"/>
+                </a:solidFill>
+                <a:latin typeface="Arial"/>
+                <a:ea typeface="Arial"/>
+                <a:cs typeface="Arial"/>
+                <a:sym typeface="Arial"/>
+              </a:defRPr>
+            </a:lvl8pPr>
+            <a:lvl9pPr marR="0" lvl="8" algn="l" rtl="0">
+              <a:lnSpc>
+                <a:spcPct val="100000"/>
+              </a:lnSpc>
+              <a:spcBef>
+                <a:spcPts val="0"/>
+              </a:spcBef>
+              <a:spcAft>
+                <a:spcPts val="0"/>
+              </a:spcAft>
+              <a:buClr>
+                <a:srgbClr val="000000"/>
+              </a:buClr>
+              <a:buFont typeface="Arial"/>
+              <a:defRPr sz="1400" b="0" i="0" u="none" strike="noStrike" cap="none">
+                <a:solidFill>
+                  <a:srgbClr val="000000"/>
+                </a:solidFill>
+                <a:latin typeface="Arial"/>
+                <a:ea typeface="Arial"/>
+                <a:cs typeface="Arial"/>
+                <a:sym typeface="Arial"/>
+              </a:defRPr>
+            </a:lvl9pPr>
+          </a:lstStyle>
+          <a:p>
+            <a:pPr marL="0" marR="0" lvl="0" indent="0" algn="l" rtl="0">
+              <a:spcBef>
+                <a:spcPts val="0"/>
+              </a:spcBef>
+              <a:spcAft>
+                <a:spcPts val="0"/>
+              </a:spcAft>
+              <a:buNone/>
+            </a:pPr>
+            <a:endParaRPr sz="1800">
+              <a:highlight>
+                <a:schemeClr val="lt1"/>
+              </a:highlight>
+            </a:endParaRPr>
+          </a:p>
+        </p:txBody>
+      </p:sp>
+      <p:sp>
+        <p:nvSpPr>
+          <p:cNvPr id="4" name="Google Shape;92;p17">
+            <a:extLst>
+              <a:ext uri="{FF2B5EF4-FFF2-40B4-BE49-F238E27FC236}">
+                <a16:creationId xmlns:a16="http://schemas.microsoft.com/office/drawing/2014/main" id="{1149C26A-9C1D-45AD-87BF-3F345306D3BA}"/>
+              </a:ext>
+            </a:extLst>
+          </p:cNvPr>
+          <p:cNvSpPr txBox="1"/>
+          <p:nvPr/>
+        </p:nvSpPr>
+        <p:spPr>
+          <a:xfrm>
+            <a:off x="673312" y="433478"/>
+            <a:ext cx="7025005" cy="908385"/>
+          </a:xfrm>
+          <a:prstGeom prst="rect">
+            <a:avLst/>
+          </a:prstGeom>
+          <a:noFill/>
+          <a:ln>
+            <a:noFill/>
+          </a:ln>
+        </p:spPr>
+        <p:txBody>
+          <a:bodyPr spcFirstLastPara="1" wrap="square" lIns="0" tIns="0" rIns="0" bIns="0" anchor="t" anchorCtr="0">
+            <a:noAutofit/>
+          </a:bodyPr>
+          <a:lstStyle/>
+          <a:p>
+            <a:pPr marL="8255"/>
+            <a:r>
+              <a:rPr lang="en-US" sz="4400" b="1">
+                <a:solidFill>
+                  <a:srgbClr val="666666"/>
+                </a:solidFill>
+                <a:latin typeface="Avenir Next LT Pro"/>
+                <a:sym typeface="Barlow Black"/>
+              </a:rPr>
+              <a:t>OBSERVABILITY </a:t>
+            </a:r>
+            <a:endParaRPr lang="en-US">
+              <a:solidFill>
+                <a:srgbClr val="000000"/>
+              </a:solidFill>
+              <a:latin typeface="Calibri" panose="020F0502020204030204"/>
+              <a:cs typeface="Calibri" panose="020F0502020204030204"/>
+              <a:sym typeface="Barlow Black"/>
+            </a:endParaRPr>
+          </a:p>
+          <a:p>
+            <a:pPr marL="8255"/>
+            <a:r>
+              <a:rPr lang="en-US" sz="4400" b="1">
+                <a:solidFill>
+                  <a:srgbClr val="666666"/>
+                </a:solidFill>
+                <a:latin typeface="Avenir Next LT Pro"/>
+                <a:sym typeface="Barlow Black"/>
+              </a:rPr>
+              <a:t>IN EKS</a:t>
+            </a:r>
+            <a:endParaRPr lang="en-US">
+              <a:cs typeface="Calibri"/>
+            </a:endParaRPr>
+          </a:p>
+        </p:txBody>
+      </p:sp>
+    </p:spTree>
+    <p:extLst>
+      <p:ext uri="{BB962C8B-B14F-4D97-AF65-F5344CB8AC3E}">
+        <p14:creationId xmlns:p14="http://schemas.microsoft.com/office/powerpoint/2010/main" val="85318453"/>
+      </p:ext>
+    </p:extLst>
+  </p:cSld>
+  <p:clrMapOvr>
+    <a:masterClrMapping/>
+  </p:clrMapOvr>
+</p:sld>
+</file>
+
+<file path=ppt/slides/slide23.xml><?xml version="1.0" encoding="utf-8"?>
+<p:sld xmlns:a="http://schemas.openxmlformats.org/drawingml/2006/main" xmlns:r="http://schemas.openxmlformats.org/officeDocument/2006/relationships" xmlns:p="http://schemas.openxmlformats.org/presentationml/2006/main">
+  <p:cSld>
+    <p:spTree>
+      <p:nvGrpSpPr>
+        <p:cNvPr id="1" name=""/>
+        <p:cNvGrpSpPr/>
+        <p:nvPr/>
+      </p:nvGrpSpPr>
+      <p:grpSpPr>
+        <a:xfrm>
+          <a:off x="0" y="0"/>
+          <a:ext cx="0" cy="0"/>
+          <a:chOff x="0" y="0"/>
+          <a:chExt cx="0" cy="0"/>
+        </a:xfrm>
+      </p:grpSpPr>
+      <p:sp>
+        <p:nvSpPr>
           <p:cNvPr id="2" name="Title 1">
             <a:extLst>
               <a:ext uri="{FF2B5EF4-FFF2-40B4-BE49-F238E27FC236}">
@@ -24069,7 +25623,7 @@
 </p:sld>
 </file>
 
-<file path=ppt/slides/slide21.xml><?xml version="1.0" encoding="utf-8"?>
+<file path=ppt/slides/slide24.xml><?xml version="1.0" encoding="utf-8"?>
 <p:sld xmlns:a="http://schemas.openxmlformats.org/drawingml/2006/main" xmlns:r="http://schemas.openxmlformats.org/officeDocument/2006/relationships" xmlns:p="http://schemas.openxmlformats.org/presentationml/2006/main">
   <p:cSld>
     <p:spTree>
@@ -24150,16 +25704,6 @@
                 <a:ea typeface="+mn-lt"/>
                 <a:cs typeface="+mn-lt"/>
               </a:rPr>
-              <a:t>https://www.eksworkshop.com/beginner/150_spotworkers/deployhandler/</a:t>
-            </a:r>
-          </a:p>
-          <a:p>
-            <a:r>
-              <a:rPr lang="en-US" sz="1800" dirty="0">
-                <a:latin typeface="Avenir Next LT Pro"/>
-                <a:ea typeface="+mn-lt"/>
-                <a:cs typeface="+mn-lt"/>
-              </a:rPr>
               <a:t>https://docs.aws.amazon.com/eks/latest/userguide/add-user-role.html</a:t>
             </a:r>
           </a:p>
@@ -24180,7 +25724,7 @@
                 <a:ea typeface="+mn-lt"/>
                 <a:cs typeface="+mn-lt"/>
               </a:rPr>
-              <a:t>https://aws.amazon.com/ec2/spot/pricing/</a:t>
+              <a:t>https://aws.amazon.com/blogs/containers/de-mystifying-cluster-networking-for-amazon-eks-worker-nodes/</a:t>
             </a:r>
           </a:p>
           <a:p>
@@ -24190,8 +25734,21 @@
                 <a:ea typeface="+mn-lt"/>
                 <a:cs typeface="+mn-lt"/>
               </a:rPr>
-              <a:t>https://aws.amazon.com/blogs/containers/de-mystifying-cluster-networking-for-amazon-eks-worker-nodes/</a:t>
+              <a:t>https://www.eksworkshop.com/beginner/150_spotworkers/deployhandler/</a:t>
             </a:r>
+          </a:p>
+          <a:p>
+            <a:r>
+              <a:rPr lang="en-US" sz="1800" dirty="0">
+                <a:latin typeface="Avenir Next LT Pro"/>
+                <a:ea typeface="+mn-lt"/>
+                <a:cs typeface="+mn-lt"/>
+              </a:rPr>
+              <a:t>https://aws.amazon.com/ec2/spot/pricing/</a:t>
+            </a:r>
+            <a:endParaRPr lang="en-US">
+              <a:latin typeface="Avenir Next LT Pro"/>
+            </a:endParaRPr>
           </a:p>
           <a:p>
             <a:r>
@@ -24599,7 +26156,7 @@
 </p:sld>
 </file>
 
-<file path=ppt/slides/slide22.xml><?xml version="1.0" encoding="utf-8"?>
+<file path=ppt/slides/slide25.xml><?xml version="1.0" encoding="utf-8"?>
 <p:sld xmlns:a="http://schemas.openxmlformats.org/drawingml/2006/main" xmlns:r="http://schemas.openxmlformats.org/officeDocument/2006/relationships" xmlns:p="http://schemas.openxmlformats.org/presentationml/2006/main">
   <p:cSld>
     <p:spTree>
@@ -25010,7 +26567,7 @@
 </p:sld>
 </file>
 
-<file path=ppt/slides/slide23.xml><?xml version="1.0" encoding="utf-8"?>
+<file path=ppt/slides/slide26.xml><?xml version="1.0" encoding="utf-8"?>
 <p:sld xmlns:a="http://schemas.openxmlformats.org/drawingml/2006/main" xmlns:r="http://schemas.openxmlformats.org/officeDocument/2006/relationships" xmlns:p="http://schemas.openxmlformats.org/presentationml/2006/main">
   <p:cSld>
     <p:spTree>
@@ -30535,15 +32092,6 @@
 </file>
 
 <file path=customXml/item1.xml><?xml version="1.0" encoding="utf-8"?>
-<?mso-contentType ?>
-<FormTemplates xmlns="http://schemas.microsoft.com/sharepoint/v3/contenttype/forms">
-  <Display>DocumentLibraryForm</Display>
-  <Edit>DocumentLibraryForm</Edit>
-  <New>DocumentLibraryForm</New>
-</FormTemplates>
-</file>
-
-<file path=customXml/item2.xml><?xml version="1.0" encoding="utf-8"?>
 <p:properties xmlns:p="http://schemas.microsoft.com/office/2006/metadata/properties" xmlns:xsi="http://www.w3.org/2001/XMLSchema-instance" xmlns:pc="http://schemas.microsoft.com/office/infopath/2007/PartnerControls">
   <documentManagement>
     <SharedWithUsers xmlns="b4f350fd-9542-4c7d-a1d2-9e21c5e0cbf2">
@@ -30575,6 +32123,15 @@
     </SharedWithUsers>
   </documentManagement>
 </p:properties>
+</file>
+
+<file path=customXml/item2.xml><?xml version="1.0" encoding="utf-8"?>
+<?mso-contentType ?>
+<FormTemplates xmlns="http://schemas.microsoft.com/sharepoint/v3/contenttype/forms">
+  <Display>DocumentLibraryForm</Display>
+  <Edit>DocumentLibraryForm</Edit>
+  <New>DocumentLibraryForm</New>
+</FormTemplates>
 </file>
 
 <file path=customXml/item3.xml><?xml version="1.0" encoding="utf-8"?>
@@ -30795,19 +32352,19 @@
 </file>
 
 <file path=customXml/itemProps1.xml><?xml version="1.0" encoding="utf-8"?>
-<ds:datastoreItem xmlns:ds="http://schemas.openxmlformats.org/officeDocument/2006/customXml" ds:itemID="{217E5CF4-403F-4141-B6A5-5070187DC6EC}">
+<ds:datastoreItem xmlns:ds="http://schemas.openxmlformats.org/officeDocument/2006/customXml" ds:itemID="{6E54ECD0-7F3F-4F72-AC02-DEE1B9A4E97A}">
   <ds:schemaRefs>
-    <ds:schemaRef ds:uri="http://schemas.microsoft.com/sharepoint/v3/contenttype/forms"/>
+    <ds:schemaRef ds:uri="http://schemas.microsoft.com/office/2006/metadata/properties"/>
+    <ds:schemaRef ds:uri="http://schemas.microsoft.com/office/infopath/2007/PartnerControls"/>
+    <ds:schemaRef ds:uri="b4f350fd-9542-4c7d-a1d2-9e21c5e0cbf2"/>
   </ds:schemaRefs>
 </ds:datastoreItem>
 </file>
 
 <file path=customXml/itemProps2.xml><?xml version="1.0" encoding="utf-8"?>
-<ds:datastoreItem xmlns:ds="http://schemas.openxmlformats.org/officeDocument/2006/customXml" ds:itemID="{6E54ECD0-7F3F-4F72-AC02-DEE1B9A4E97A}">
+<ds:datastoreItem xmlns:ds="http://schemas.openxmlformats.org/officeDocument/2006/customXml" ds:itemID="{217E5CF4-403F-4141-B6A5-5070187DC6EC}">
   <ds:schemaRefs>
-    <ds:schemaRef ds:uri="http://schemas.microsoft.com/office/2006/metadata/properties"/>
-    <ds:schemaRef ds:uri="http://schemas.microsoft.com/office/infopath/2007/PartnerControls"/>
-    <ds:schemaRef ds:uri="b4f350fd-9542-4c7d-a1d2-9e21c5e0cbf2"/>
+    <ds:schemaRef ds:uri="http://schemas.microsoft.com/sharepoint/v3/contenttype/forms"/>
   </ds:schemaRefs>
 </ds:datastoreItem>
 </file>

</xml_diff>